<commit_message>
Update meines Teils der Projektskizze und dem Mock-Up. Ausserdem noch ein kleines Bildli, einfach so als Logo-Idee.
</commit_message>
<xml_diff>
--- a/Documents/Projektskizze/docker_mock_up.pptx
+++ b/Documents/Projektskizze/docker_mock_up.pptx
@@ -243,7 +243,7 @@
           <a:p>
             <a:fld id="{240477B1-2D1B-4A37-88DE-78BFA2AD584C}" type="datetimeFigureOut">
               <a:rPr lang="de-CH" smtClean="0"/>
-              <a:t>25.09.2014</a:t>
+              <a:t>26.09.2014</a:t>
             </a:fld>
             <a:endParaRPr lang="de-CH"/>
           </a:p>
@@ -413,7 +413,7 @@
           <a:p>
             <a:fld id="{240477B1-2D1B-4A37-88DE-78BFA2AD584C}" type="datetimeFigureOut">
               <a:rPr lang="de-CH" smtClean="0"/>
-              <a:t>25.09.2014</a:t>
+              <a:t>26.09.2014</a:t>
             </a:fld>
             <a:endParaRPr lang="de-CH"/>
           </a:p>
@@ -593,7 +593,7 @@
           <a:p>
             <a:fld id="{240477B1-2D1B-4A37-88DE-78BFA2AD584C}" type="datetimeFigureOut">
               <a:rPr lang="de-CH" smtClean="0"/>
-              <a:t>25.09.2014</a:t>
+              <a:t>26.09.2014</a:t>
             </a:fld>
             <a:endParaRPr lang="de-CH"/>
           </a:p>
@@ -763,7 +763,7 @@
           <a:p>
             <a:fld id="{240477B1-2D1B-4A37-88DE-78BFA2AD584C}" type="datetimeFigureOut">
               <a:rPr lang="de-CH" smtClean="0"/>
-              <a:t>25.09.2014</a:t>
+              <a:t>26.09.2014</a:t>
             </a:fld>
             <a:endParaRPr lang="de-CH"/>
           </a:p>
@@ -1009,7 +1009,7 @@
           <a:p>
             <a:fld id="{240477B1-2D1B-4A37-88DE-78BFA2AD584C}" type="datetimeFigureOut">
               <a:rPr lang="de-CH" smtClean="0"/>
-              <a:t>25.09.2014</a:t>
+              <a:t>26.09.2014</a:t>
             </a:fld>
             <a:endParaRPr lang="de-CH"/>
           </a:p>
@@ -1241,7 +1241,7 @@
           <a:p>
             <a:fld id="{240477B1-2D1B-4A37-88DE-78BFA2AD584C}" type="datetimeFigureOut">
               <a:rPr lang="de-CH" smtClean="0"/>
-              <a:t>25.09.2014</a:t>
+              <a:t>26.09.2014</a:t>
             </a:fld>
             <a:endParaRPr lang="de-CH"/>
           </a:p>
@@ -1608,7 +1608,7 @@
           <a:p>
             <a:fld id="{240477B1-2D1B-4A37-88DE-78BFA2AD584C}" type="datetimeFigureOut">
               <a:rPr lang="de-CH" smtClean="0"/>
-              <a:t>25.09.2014</a:t>
+              <a:t>26.09.2014</a:t>
             </a:fld>
             <a:endParaRPr lang="de-CH"/>
           </a:p>
@@ -1726,7 +1726,7 @@
           <a:p>
             <a:fld id="{240477B1-2D1B-4A37-88DE-78BFA2AD584C}" type="datetimeFigureOut">
               <a:rPr lang="de-CH" smtClean="0"/>
-              <a:t>25.09.2014</a:t>
+              <a:t>26.09.2014</a:t>
             </a:fld>
             <a:endParaRPr lang="de-CH"/>
           </a:p>
@@ -1821,7 +1821,7 @@
           <a:p>
             <a:fld id="{240477B1-2D1B-4A37-88DE-78BFA2AD584C}" type="datetimeFigureOut">
               <a:rPr lang="de-CH" smtClean="0"/>
-              <a:t>25.09.2014</a:t>
+              <a:t>26.09.2014</a:t>
             </a:fld>
             <a:endParaRPr lang="de-CH"/>
           </a:p>
@@ -2098,7 +2098,7 @@
           <a:p>
             <a:fld id="{240477B1-2D1B-4A37-88DE-78BFA2AD584C}" type="datetimeFigureOut">
               <a:rPr lang="de-CH" smtClean="0"/>
-              <a:t>25.09.2014</a:t>
+              <a:t>26.09.2014</a:t>
             </a:fld>
             <a:endParaRPr lang="de-CH"/>
           </a:p>
@@ -2351,7 +2351,7 @@
           <a:p>
             <a:fld id="{240477B1-2D1B-4A37-88DE-78BFA2AD584C}" type="datetimeFigureOut">
               <a:rPr lang="de-CH" smtClean="0"/>
-              <a:t>25.09.2014</a:t>
+              <a:t>26.09.2014</a:t>
             </a:fld>
             <a:endParaRPr lang="de-CH"/>
           </a:p>
@@ -2564,7 +2564,7 @@
           <a:p>
             <a:fld id="{240477B1-2D1B-4A37-88DE-78BFA2AD584C}" type="datetimeFigureOut">
               <a:rPr lang="de-CH" smtClean="0"/>
-              <a:t>25.09.2014</a:t>
+              <a:t>26.09.2014</a:t>
             </a:fld>
             <a:endParaRPr lang="de-CH"/>
           </a:p>
@@ -3735,7 +3735,7 @@
         </p:nvSpPr>
         <p:spPr>
           <a:xfrm>
-            <a:off x="1402468" y="3503607"/>
+            <a:off x="756423" y="3503607"/>
             <a:ext cx="102242" cy="1056818"/>
           </a:xfrm>
           <a:prstGeom prst="rect">
@@ -3787,7 +3787,7 @@
         </p:nvSpPr>
         <p:spPr>
           <a:xfrm>
-            <a:off x="1113775" y="4305782"/>
+            <a:off x="467730" y="4305782"/>
             <a:ext cx="288694" cy="148348"/>
           </a:xfrm>
           <a:prstGeom prst="rect">
@@ -3839,7 +3839,7 @@
         </p:nvSpPr>
         <p:spPr>
           <a:xfrm>
-            <a:off x="9734310" y="2916820"/>
+            <a:off x="9785110" y="2916820"/>
             <a:ext cx="1215118" cy="1537311"/>
           </a:xfrm>
           <a:prstGeom prst="rect">
@@ -3891,7 +3891,7 @@
         </p:nvSpPr>
         <p:spPr>
           <a:xfrm>
-            <a:off x="10280585" y="2662740"/>
+            <a:off x="10331385" y="2662740"/>
             <a:ext cx="600759" cy="236401"/>
           </a:xfrm>
           <a:prstGeom prst="rect">
@@ -3985,8 +3985,8 @@
         </p:nvSpPr>
         <p:spPr>
           <a:xfrm rot="10800000">
-            <a:off x="963914" y="4461139"/>
-            <a:ext cx="10281920" cy="599440"/>
+            <a:off x="379785" y="4461139"/>
+            <a:ext cx="10866049" cy="599440"/>
           </a:xfrm>
           <a:prstGeom prst="trapezoid">
             <a:avLst/>
@@ -4036,8 +4036,8 @@
         </p:nvSpPr>
         <p:spPr>
           <a:xfrm rot="10800000">
-            <a:off x="1113774" y="5060580"/>
-            <a:ext cx="9982200" cy="599440"/>
+            <a:off x="527685" y="5060580"/>
+            <a:ext cx="10568289" cy="599440"/>
           </a:xfrm>
           <a:prstGeom prst="trapezoid">
             <a:avLst/>
@@ -4125,7 +4125,7 @@
         </p:nvSpPr>
         <p:spPr>
           <a:xfrm>
-            <a:off x="9898622" y="2426570"/>
+            <a:off x="9949422" y="2426570"/>
             <a:ext cx="381963" cy="483242"/>
           </a:xfrm>
           <a:prstGeom prst="rect">
@@ -4177,7 +4177,7 @@
         </p:nvSpPr>
         <p:spPr>
           <a:xfrm>
-            <a:off x="9734310" y="3078189"/>
+            <a:off x="9785110" y="3078189"/>
             <a:ext cx="903966" cy="138349"/>
           </a:xfrm>
           <a:prstGeom prst="rect">
@@ -4231,7 +4231,7 @@
         </p:nvSpPr>
         <p:spPr>
           <a:xfrm>
-            <a:off x="9734310" y="3377907"/>
+            <a:off x="9785110" y="3377907"/>
             <a:ext cx="486136" cy="125700"/>
           </a:xfrm>
           <a:prstGeom prst="rect">
@@ -4285,7 +4285,7 @@
         </p:nvSpPr>
         <p:spPr>
           <a:xfrm>
-            <a:off x="10723832" y="3377907"/>
+            <a:off x="10774632" y="3377907"/>
             <a:ext cx="157512" cy="137901"/>
           </a:xfrm>
           <a:prstGeom prst="rect">
@@ -4339,7 +4339,7 @@
         </p:nvSpPr>
         <p:spPr>
           <a:xfrm>
-            <a:off x="10723832" y="3769888"/>
+            <a:off x="10774632" y="3769888"/>
             <a:ext cx="157512" cy="137901"/>
           </a:xfrm>
           <a:prstGeom prst="rect">
@@ -4393,7 +4393,7 @@
         </p:nvSpPr>
         <p:spPr>
           <a:xfrm>
-            <a:off x="10344595" y="3769888"/>
+            <a:off x="10395395" y="3769888"/>
             <a:ext cx="157512" cy="137901"/>
           </a:xfrm>
           <a:prstGeom prst="rect">
@@ -4447,7 +4447,7 @@
         </p:nvSpPr>
         <p:spPr>
           <a:xfrm>
-            <a:off x="9898622" y="3792748"/>
+            <a:off x="9949422" y="3792748"/>
             <a:ext cx="157512" cy="137901"/>
           </a:xfrm>
           <a:prstGeom prst="rect">
@@ -4501,7 +4501,7 @@
         </p:nvSpPr>
         <p:spPr>
           <a:xfrm>
-            <a:off x="10587764" y="2433418"/>
+            <a:off x="10638564" y="2433418"/>
             <a:ext cx="136068" cy="204565"/>
           </a:xfrm>
           <a:prstGeom prst="rect">
@@ -4925,7 +4925,7 @@
         </p:nvSpPr>
         <p:spPr>
           <a:xfrm>
-            <a:off x="1566781" y="3448377"/>
+            <a:off x="920736" y="3448377"/>
             <a:ext cx="975360" cy="975360"/>
           </a:xfrm>
           <a:prstGeom prst="rect">
@@ -4979,7 +4979,7 @@
         </p:nvSpPr>
         <p:spPr>
           <a:xfrm>
-            <a:off x="4516465" y="3448363"/>
+            <a:off x="3870420" y="3448363"/>
             <a:ext cx="2926080" cy="975360"/>
           </a:xfrm>
           <a:prstGeom prst="rect">
@@ -5033,7 +5033,7 @@
         </p:nvSpPr>
         <p:spPr>
           <a:xfrm>
-            <a:off x="2576268" y="3448377"/>
+            <a:off x="1930223" y="3448377"/>
             <a:ext cx="1910790" cy="975360"/>
           </a:xfrm>
           <a:prstGeom prst="rect">
@@ -5085,7 +5085,7 @@
         </p:nvSpPr>
         <p:spPr>
           <a:xfrm>
-            <a:off x="8723487" y="3469145"/>
+            <a:off x="8723487" y="3458985"/>
             <a:ext cx="975360" cy="975360"/>
           </a:xfrm>
           <a:prstGeom prst="rect">
@@ -5137,7 +5137,7 @@
         </p:nvSpPr>
         <p:spPr>
           <a:xfrm>
-            <a:off x="1566781" y="2450506"/>
+            <a:off x="920736" y="2450506"/>
             <a:ext cx="1910790" cy="975360"/>
           </a:xfrm>
           <a:prstGeom prst="rect">
@@ -7388,7 +7388,7 @@
         </p:nvSpPr>
         <p:spPr>
           <a:xfrm>
-            <a:off x="4523579" y="2433321"/>
+            <a:off x="3877534" y="2433321"/>
             <a:ext cx="1910790" cy="975360"/>
           </a:xfrm>
           <a:prstGeom prst="rect">

</xml_diff>

<commit_message>
Mock Up um Hafenkran erweitert.
</commit_message>
<xml_diff>
--- a/Documents/Projektskizze/docker_mock_up.pptx
+++ b/Documents/Projektskizze/docker_mock_up.pptx
@@ -6,6 +6,7 @@
   </p:sldMasterIdLst>
   <p:sldIdLst>
     <p:sldId id="257" r:id="rId2"/>
+    <p:sldId id="258" r:id="rId3"/>
   </p:sldIdLst>
   <p:sldSz cx="12192000" cy="6858000"/>
   <p:notesSz cx="6858000" cy="9144000"/>
@@ -243,7 +244,7 @@
           <a:p>
             <a:fld id="{240477B1-2D1B-4A37-88DE-78BFA2AD584C}" type="datetimeFigureOut">
               <a:rPr lang="de-CH" smtClean="0"/>
-              <a:t>26.09.2014</a:t>
+              <a:t>27.09.2014</a:t>
             </a:fld>
             <a:endParaRPr lang="de-CH"/>
           </a:p>
@@ -413,7 +414,7 @@
           <a:p>
             <a:fld id="{240477B1-2D1B-4A37-88DE-78BFA2AD584C}" type="datetimeFigureOut">
               <a:rPr lang="de-CH" smtClean="0"/>
-              <a:t>26.09.2014</a:t>
+              <a:t>27.09.2014</a:t>
             </a:fld>
             <a:endParaRPr lang="de-CH"/>
           </a:p>
@@ -593,7 +594,7 @@
           <a:p>
             <a:fld id="{240477B1-2D1B-4A37-88DE-78BFA2AD584C}" type="datetimeFigureOut">
               <a:rPr lang="de-CH" smtClean="0"/>
-              <a:t>26.09.2014</a:t>
+              <a:t>27.09.2014</a:t>
             </a:fld>
             <a:endParaRPr lang="de-CH"/>
           </a:p>
@@ -763,7 +764,7 @@
           <a:p>
             <a:fld id="{240477B1-2D1B-4A37-88DE-78BFA2AD584C}" type="datetimeFigureOut">
               <a:rPr lang="de-CH" smtClean="0"/>
-              <a:t>26.09.2014</a:t>
+              <a:t>27.09.2014</a:t>
             </a:fld>
             <a:endParaRPr lang="de-CH"/>
           </a:p>
@@ -1009,7 +1010,7 @@
           <a:p>
             <a:fld id="{240477B1-2D1B-4A37-88DE-78BFA2AD584C}" type="datetimeFigureOut">
               <a:rPr lang="de-CH" smtClean="0"/>
-              <a:t>26.09.2014</a:t>
+              <a:t>27.09.2014</a:t>
             </a:fld>
             <a:endParaRPr lang="de-CH"/>
           </a:p>
@@ -1241,7 +1242,7 @@
           <a:p>
             <a:fld id="{240477B1-2D1B-4A37-88DE-78BFA2AD584C}" type="datetimeFigureOut">
               <a:rPr lang="de-CH" smtClean="0"/>
-              <a:t>26.09.2014</a:t>
+              <a:t>27.09.2014</a:t>
             </a:fld>
             <a:endParaRPr lang="de-CH"/>
           </a:p>
@@ -1608,7 +1609,7 @@
           <a:p>
             <a:fld id="{240477B1-2D1B-4A37-88DE-78BFA2AD584C}" type="datetimeFigureOut">
               <a:rPr lang="de-CH" smtClean="0"/>
-              <a:t>26.09.2014</a:t>
+              <a:t>27.09.2014</a:t>
             </a:fld>
             <a:endParaRPr lang="de-CH"/>
           </a:p>
@@ -1726,7 +1727,7 @@
           <a:p>
             <a:fld id="{240477B1-2D1B-4A37-88DE-78BFA2AD584C}" type="datetimeFigureOut">
               <a:rPr lang="de-CH" smtClean="0"/>
-              <a:t>26.09.2014</a:t>
+              <a:t>27.09.2014</a:t>
             </a:fld>
             <a:endParaRPr lang="de-CH"/>
           </a:p>
@@ -1821,7 +1822,7 @@
           <a:p>
             <a:fld id="{240477B1-2D1B-4A37-88DE-78BFA2AD584C}" type="datetimeFigureOut">
               <a:rPr lang="de-CH" smtClean="0"/>
-              <a:t>26.09.2014</a:t>
+              <a:t>27.09.2014</a:t>
             </a:fld>
             <a:endParaRPr lang="de-CH"/>
           </a:p>
@@ -2098,7 +2099,7 @@
           <a:p>
             <a:fld id="{240477B1-2D1B-4A37-88DE-78BFA2AD584C}" type="datetimeFigureOut">
               <a:rPr lang="de-CH" smtClean="0"/>
-              <a:t>26.09.2014</a:t>
+              <a:t>27.09.2014</a:t>
             </a:fld>
             <a:endParaRPr lang="de-CH"/>
           </a:p>
@@ -2351,7 +2352,7 @@
           <a:p>
             <a:fld id="{240477B1-2D1B-4A37-88DE-78BFA2AD584C}" type="datetimeFigureOut">
               <a:rPr lang="de-CH" smtClean="0"/>
-              <a:t>26.09.2014</a:t>
+              <a:t>27.09.2014</a:t>
             </a:fld>
             <a:endParaRPr lang="de-CH"/>
           </a:p>
@@ -2564,7 +2565,7 @@
           <a:p>
             <a:fld id="{240477B1-2D1B-4A37-88DE-78BFA2AD584C}" type="datetimeFigureOut">
               <a:rPr lang="de-CH" smtClean="0"/>
-              <a:t>26.09.2014</a:t>
+              <a:t>27.09.2014</a:t>
             </a:fld>
             <a:endParaRPr lang="de-CH"/>
           </a:p>
@@ -2980,6 +2981,666 @@
           <a:chExt cx="0" cy="0"/>
         </a:xfrm>
       </p:grpSpPr>
+      <p:grpSp>
+        <p:nvGrpSpPr>
+          <p:cNvPr id="21" name="Gruppieren 20"/>
+          <p:cNvGrpSpPr/>
+          <p:nvPr/>
+        </p:nvGrpSpPr>
+        <p:grpSpPr>
+          <a:xfrm>
+            <a:off x="6200693" y="915584"/>
+            <a:ext cx="3731759" cy="2441014"/>
+            <a:chOff x="2688443" y="801642"/>
+            <a:chExt cx="3731759" cy="2441014"/>
+          </a:xfrm>
+        </p:grpSpPr>
+        <p:grpSp>
+          <p:nvGrpSpPr>
+            <p:cNvPr id="143" name="Gruppieren 142"/>
+            <p:cNvGrpSpPr/>
+            <p:nvPr/>
+          </p:nvGrpSpPr>
+          <p:grpSpPr>
+            <a:xfrm>
+              <a:off x="4000052" y="801642"/>
+              <a:ext cx="1096337" cy="1116843"/>
+              <a:chOff x="9346903" y="3190240"/>
+              <a:chExt cx="1941231" cy="1977540"/>
+            </a:xfrm>
+          </p:grpSpPr>
+          <p:grpSp>
+            <p:nvGrpSpPr>
+              <p:cNvPr id="144" name="Gruppieren 143"/>
+              <p:cNvGrpSpPr/>
+              <p:nvPr/>
+            </p:nvGrpSpPr>
+            <p:grpSpPr>
+              <a:xfrm>
+                <a:off x="9346903" y="4970201"/>
+                <a:ext cx="1941231" cy="105876"/>
+                <a:chOff x="6804179" y="1612321"/>
+                <a:chExt cx="1941231" cy="105876"/>
+              </a:xfrm>
+            </p:grpSpPr>
+            <p:sp>
+              <p:nvSpPr>
+                <p:cNvPr id="150" name="Rechteck 149"/>
+                <p:cNvSpPr/>
+                <p:nvPr/>
+              </p:nvSpPr>
+              <p:spPr>
+                <a:xfrm rot="18000000">
+                  <a:off x="8188940" y="1155076"/>
+                  <a:ext cx="99225" cy="1013715"/>
+                </a:xfrm>
+                <a:prstGeom prst="rect">
+                  <a:avLst/>
+                </a:prstGeom>
+                <a:solidFill>
+                  <a:schemeClr val="bg1">
+                    <a:lumMod val="50000"/>
+                  </a:schemeClr>
+                </a:solidFill>
+                <a:ln w="38100">
+                  <a:solidFill>
+                    <a:schemeClr val="tx1">
+                      <a:lumMod val="75000"/>
+                      <a:lumOff val="25000"/>
+                    </a:schemeClr>
+                  </a:solidFill>
+                </a:ln>
+              </p:spPr>
+              <p:style>
+                <a:lnRef idx="2">
+                  <a:schemeClr val="accent1">
+                    <a:shade val="50000"/>
+                  </a:schemeClr>
+                </a:lnRef>
+                <a:fillRef idx="1">
+                  <a:schemeClr val="accent1"/>
+                </a:fillRef>
+                <a:effectRef idx="0">
+                  <a:schemeClr val="accent1"/>
+                </a:effectRef>
+                <a:fontRef idx="minor">
+                  <a:schemeClr val="lt1"/>
+                </a:fontRef>
+              </p:style>
+              <p:txBody>
+                <a:bodyPr rtlCol="0" anchor="ctr"/>
+                <a:lstStyle/>
+                <a:p>
+                  <a:pPr algn="ctr"/>
+                  <a:endParaRPr lang="de-CH" sz="4400"/>
+                </a:p>
+              </p:txBody>
+            </p:sp>
+            <p:sp>
+              <p:nvSpPr>
+                <p:cNvPr id="151" name="Rechteck 150"/>
+                <p:cNvSpPr/>
+                <p:nvPr/>
+              </p:nvSpPr>
+              <p:spPr>
+                <a:xfrm rot="3600000">
+                  <a:off x="7261424" y="1161727"/>
+                  <a:ext cx="99225" cy="1013715"/>
+                </a:xfrm>
+                <a:prstGeom prst="rect">
+                  <a:avLst/>
+                </a:prstGeom>
+                <a:solidFill>
+                  <a:schemeClr val="bg1">
+                    <a:lumMod val="50000"/>
+                  </a:schemeClr>
+                </a:solidFill>
+                <a:ln w="38100">
+                  <a:solidFill>
+                    <a:schemeClr val="tx1">
+                      <a:lumMod val="75000"/>
+                      <a:lumOff val="25000"/>
+                    </a:schemeClr>
+                  </a:solidFill>
+                </a:ln>
+              </p:spPr>
+              <p:style>
+                <a:lnRef idx="2">
+                  <a:schemeClr val="accent1">
+                    <a:shade val="50000"/>
+                  </a:schemeClr>
+                </a:lnRef>
+                <a:fillRef idx="1">
+                  <a:schemeClr val="accent1"/>
+                </a:fillRef>
+                <a:effectRef idx="0">
+                  <a:schemeClr val="accent1"/>
+                </a:effectRef>
+                <a:fontRef idx="minor">
+                  <a:schemeClr val="lt1"/>
+                </a:fontRef>
+              </p:style>
+              <p:txBody>
+                <a:bodyPr rtlCol="0" anchor="ctr"/>
+                <a:lstStyle/>
+                <a:p>
+                  <a:pPr algn="ctr"/>
+                  <a:endParaRPr lang="de-CH" sz="4400"/>
+                </a:p>
+              </p:txBody>
+            </p:sp>
+          </p:grpSp>
+          <p:grpSp>
+            <p:nvGrpSpPr>
+              <p:cNvPr id="145" name="Gruppieren 144"/>
+              <p:cNvGrpSpPr/>
+              <p:nvPr/>
+            </p:nvGrpSpPr>
+            <p:grpSpPr>
+              <a:xfrm>
+                <a:off x="9964417" y="3190240"/>
+                <a:ext cx="706205" cy="1977540"/>
+                <a:chOff x="9964417" y="3190240"/>
+                <a:chExt cx="706205" cy="1977540"/>
+              </a:xfrm>
+            </p:grpSpPr>
+            <p:sp>
+              <p:nvSpPr>
+                <p:cNvPr id="146" name="Rechteck 145"/>
+                <p:cNvSpPr/>
+                <p:nvPr/>
+              </p:nvSpPr>
+              <p:spPr>
+                <a:xfrm>
+                  <a:off x="10248649" y="4232022"/>
+                  <a:ext cx="137743" cy="272956"/>
+                </a:xfrm>
+                <a:prstGeom prst="rect">
+                  <a:avLst/>
+                </a:prstGeom>
+                <a:solidFill>
+                  <a:schemeClr val="bg1">
+                    <a:lumMod val="50000"/>
+                  </a:schemeClr>
+                </a:solidFill>
+                <a:ln w="38100">
+                  <a:solidFill>
+                    <a:schemeClr val="tx1">
+                      <a:lumMod val="75000"/>
+                      <a:lumOff val="25000"/>
+                    </a:schemeClr>
+                  </a:solidFill>
+                </a:ln>
+              </p:spPr>
+              <p:style>
+                <a:lnRef idx="2">
+                  <a:schemeClr val="accent1">
+                    <a:shade val="50000"/>
+                  </a:schemeClr>
+                </a:lnRef>
+                <a:fillRef idx="1">
+                  <a:schemeClr val="accent1"/>
+                </a:fillRef>
+                <a:effectRef idx="0">
+                  <a:schemeClr val="accent1"/>
+                </a:effectRef>
+                <a:fontRef idx="minor">
+                  <a:schemeClr val="lt1"/>
+                </a:fontRef>
+              </p:style>
+              <p:txBody>
+                <a:bodyPr rtlCol="0" anchor="ctr"/>
+                <a:lstStyle/>
+                <a:p>
+                  <a:pPr algn="ctr"/>
+                  <a:endParaRPr lang="de-CH" sz="4400"/>
+                </a:p>
+              </p:txBody>
+            </p:sp>
+            <p:sp>
+              <p:nvSpPr>
+                <p:cNvPr id="147" name="Trapezoid 146"/>
+                <p:cNvSpPr/>
+                <p:nvPr/>
+              </p:nvSpPr>
+              <p:spPr>
+                <a:xfrm>
+                  <a:off x="10086339" y="4504977"/>
+                  <a:ext cx="467360" cy="662803"/>
+                </a:xfrm>
+                <a:prstGeom prst="trapezoid">
+                  <a:avLst/>
+                </a:prstGeom>
+                <a:solidFill>
+                  <a:srgbClr val="FDC527"/>
+                </a:solidFill>
+                <a:ln w="38100">
+                  <a:solidFill>
+                    <a:schemeClr val="accent4">
+                      <a:lumMod val="50000"/>
+                    </a:schemeClr>
+                  </a:solidFill>
+                </a:ln>
+              </p:spPr>
+              <p:style>
+                <a:lnRef idx="2">
+                  <a:schemeClr val="accent1">
+                    <a:shade val="50000"/>
+                  </a:schemeClr>
+                </a:lnRef>
+                <a:fillRef idx="1">
+                  <a:schemeClr val="accent1"/>
+                </a:fillRef>
+                <a:effectRef idx="0">
+                  <a:schemeClr val="accent1"/>
+                </a:effectRef>
+                <a:fontRef idx="minor">
+                  <a:schemeClr val="lt1"/>
+                </a:fontRef>
+              </p:style>
+              <p:txBody>
+                <a:bodyPr rtlCol="0" anchor="ctr"/>
+                <a:lstStyle/>
+                <a:p>
+                  <a:pPr algn="ctr"/>
+                  <a:endParaRPr lang="de-CH" sz="4400"/>
+                </a:p>
+              </p:txBody>
+            </p:sp>
+            <p:sp>
+              <p:nvSpPr>
+                <p:cNvPr id="148" name="Trapezoid 147"/>
+                <p:cNvSpPr/>
+                <p:nvPr/>
+              </p:nvSpPr>
+              <p:spPr>
+                <a:xfrm flipV="1">
+                  <a:off x="9964417" y="3978022"/>
+                  <a:ext cx="706205" cy="254000"/>
+                </a:xfrm>
+                <a:prstGeom prst="trapezoid">
+                  <a:avLst/>
+                </a:prstGeom>
+                <a:solidFill>
+                  <a:srgbClr val="FDC527"/>
+                </a:solidFill>
+                <a:ln w="38100">
+                  <a:solidFill>
+                    <a:schemeClr val="accent4">
+                      <a:lumMod val="50000"/>
+                    </a:schemeClr>
+                  </a:solidFill>
+                </a:ln>
+              </p:spPr>
+              <p:style>
+                <a:lnRef idx="2">
+                  <a:schemeClr val="accent1">
+                    <a:shade val="50000"/>
+                  </a:schemeClr>
+                </a:lnRef>
+                <a:fillRef idx="1">
+                  <a:schemeClr val="accent1"/>
+                </a:fillRef>
+                <a:effectRef idx="0">
+                  <a:schemeClr val="accent1"/>
+                </a:effectRef>
+                <a:fontRef idx="minor">
+                  <a:schemeClr val="lt1"/>
+                </a:fontRef>
+              </p:style>
+              <p:txBody>
+                <a:bodyPr rtlCol="0" anchor="ctr"/>
+                <a:lstStyle/>
+                <a:p>
+                  <a:pPr algn="ctr"/>
+                  <a:endParaRPr lang="de-CH" sz="4400"/>
+                </a:p>
+              </p:txBody>
+            </p:sp>
+            <p:cxnSp>
+              <p:nvCxnSpPr>
+                <p:cNvPr id="149" name="Gerader Verbinder 148"/>
+                <p:cNvCxnSpPr>
+                  <a:stCxn id="148" idx="2"/>
+                </p:cNvCxnSpPr>
+                <p:nvPr/>
+              </p:nvCxnSpPr>
+              <p:spPr>
+                <a:xfrm flipV="1">
+                  <a:off x="10317520" y="3190240"/>
+                  <a:ext cx="8600" cy="787782"/>
+                </a:xfrm>
+                <a:prstGeom prst="line">
+                  <a:avLst/>
+                </a:prstGeom>
+                <a:ln w="76200">
+                  <a:solidFill>
+                    <a:schemeClr val="bg2">
+                      <a:lumMod val="25000"/>
+                    </a:schemeClr>
+                  </a:solidFill>
+                </a:ln>
+              </p:spPr>
+              <p:style>
+                <a:lnRef idx="1">
+                  <a:schemeClr val="accent1"/>
+                </a:lnRef>
+                <a:fillRef idx="0">
+                  <a:schemeClr val="accent1"/>
+                </a:fillRef>
+                <a:effectRef idx="0">
+                  <a:schemeClr val="accent1"/>
+                </a:effectRef>
+                <a:fontRef idx="minor">
+                  <a:schemeClr val="tx1"/>
+                </a:fontRef>
+              </p:style>
+            </p:cxnSp>
+          </p:grpSp>
+        </p:grpSp>
+        <p:sp>
+          <p:nvSpPr>
+            <p:cNvPr id="152" name="Rechteck 151"/>
+            <p:cNvSpPr/>
+            <p:nvPr/>
+          </p:nvSpPr>
+          <p:spPr>
+            <a:xfrm>
+              <a:off x="2688443" y="1922241"/>
+              <a:ext cx="3731759" cy="345056"/>
+            </a:xfrm>
+            <a:prstGeom prst="rect">
+              <a:avLst/>
+            </a:prstGeom>
+            <a:solidFill>
+              <a:srgbClr val="FDC527"/>
+            </a:solidFill>
+            <a:ln w="38100">
+              <a:solidFill>
+                <a:schemeClr val="accent4">
+                  <a:lumMod val="50000"/>
+                </a:schemeClr>
+              </a:solidFill>
+            </a:ln>
+          </p:spPr>
+          <p:style>
+            <a:lnRef idx="2">
+              <a:schemeClr val="accent1">
+                <a:shade val="50000"/>
+              </a:schemeClr>
+            </a:lnRef>
+            <a:fillRef idx="1">
+              <a:schemeClr val="accent1"/>
+            </a:fillRef>
+            <a:effectRef idx="0">
+              <a:schemeClr val="accent1"/>
+            </a:effectRef>
+            <a:fontRef idx="minor">
+              <a:schemeClr val="lt1"/>
+            </a:fontRef>
+          </p:style>
+          <p:txBody>
+            <a:bodyPr rtlCol="0" anchor="ctr"/>
+            <a:lstStyle/>
+            <a:p>
+              <a:pPr algn="ctr"/>
+              <a:endParaRPr lang="de-CH" sz="4400"/>
+            </a:p>
+          </p:txBody>
+        </p:sp>
+        <p:sp>
+          <p:nvSpPr>
+            <p:cNvPr id="153" name="Rechteck 152"/>
+            <p:cNvSpPr/>
+            <p:nvPr/>
+          </p:nvSpPr>
+          <p:spPr>
+            <a:xfrm>
+              <a:off x="3592826" y="2267296"/>
+              <a:ext cx="1910790" cy="975360"/>
+            </a:xfrm>
+            <a:prstGeom prst="rect">
+              <a:avLst/>
+            </a:prstGeom>
+            <a:solidFill>
+              <a:srgbClr val="C00000"/>
+            </a:solidFill>
+            <a:ln w="38100">
+              <a:solidFill>
+                <a:srgbClr val="800000"/>
+              </a:solidFill>
+            </a:ln>
+          </p:spPr>
+          <p:style>
+            <a:lnRef idx="2">
+              <a:schemeClr val="accent1">
+                <a:shade val="50000"/>
+              </a:schemeClr>
+            </a:lnRef>
+            <a:fillRef idx="1">
+              <a:schemeClr val="accent1"/>
+            </a:fillRef>
+            <a:effectRef idx="0">
+              <a:schemeClr val="accent1"/>
+            </a:effectRef>
+            <a:fontRef idx="minor">
+              <a:schemeClr val="lt1"/>
+            </a:fontRef>
+          </p:style>
+          <p:txBody>
+            <a:bodyPr rtlCol="0" anchor="ctr"/>
+            <a:lstStyle/>
+            <a:p>
+              <a:pPr algn="ctr"/>
+              <a:r>
+                <a:rPr lang="de-CH" sz="4400" dirty="0"/>
+                <a:t>4</a:t>
+              </a:r>
+              <a:endParaRPr lang="de-CH" sz="4400" dirty="0"/>
+            </a:p>
+          </p:txBody>
+        </p:sp>
+        <p:sp>
+          <p:nvSpPr>
+            <p:cNvPr id="154" name="Gleichschenkliges Dreieck 153"/>
+            <p:cNvSpPr/>
+            <p:nvPr/>
+          </p:nvSpPr>
+          <p:spPr>
+            <a:xfrm rot="5400000">
+              <a:off x="5407346" y="2399538"/>
+              <a:ext cx="443973" cy="179490"/>
+            </a:xfrm>
+            <a:prstGeom prst="triangle">
+              <a:avLst>
+                <a:gd name="adj" fmla="val 0"/>
+              </a:avLst>
+            </a:prstGeom>
+            <a:solidFill>
+              <a:srgbClr val="FDC527"/>
+            </a:solidFill>
+            <a:ln w="38100">
+              <a:solidFill>
+                <a:schemeClr val="accent4">
+                  <a:lumMod val="50000"/>
+                </a:schemeClr>
+              </a:solidFill>
+            </a:ln>
+          </p:spPr>
+          <p:style>
+            <a:lnRef idx="2">
+              <a:schemeClr val="accent1">
+                <a:shade val="50000"/>
+              </a:schemeClr>
+            </a:lnRef>
+            <a:fillRef idx="1">
+              <a:schemeClr val="accent1"/>
+            </a:fillRef>
+            <a:effectRef idx="0">
+              <a:schemeClr val="accent1"/>
+            </a:effectRef>
+            <a:fontRef idx="minor">
+              <a:schemeClr val="lt1"/>
+            </a:fontRef>
+          </p:style>
+          <p:txBody>
+            <a:bodyPr rtlCol="0" anchor="ctr"/>
+            <a:lstStyle/>
+            <a:p>
+              <a:pPr algn="ctr"/>
+              <a:endParaRPr lang="de-CH" sz="4400"/>
+            </a:p>
+          </p:txBody>
+        </p:sp>
+        <p:sp>
+          <p:nvSpPr>
+            <p:cNvPr id="155" name="Gleichschenkliges Dreieck 154"/>
+            <p:cNvSpPr/>
+            <p:nvPr/>
+          </p:nvSpPr>
+          <p:spPr>
+            <a:xfrm rot="5400000" flipV="1">
+              <a:off x="3240291" y="2394706"/>
+              <a:ext cx="443973" cy="189155"/>
+            </a:xfrm>
+            <a:prstGeom prst="triangle">
+              <a:avLst>
+                <a:gd name="adj" fmla="val 0"/>
+              </a:avLst>
+            </a:prstGeom>
+            <a:solidFill>
+              <a:srgbClr val="FDC527"/>
+            </a:solidFill>
+            <a:ln w="38100">
+              <a:solidFill>
+                <a:schemeClr val="accent4">
+                  <a:lumMod val="50000"/>
+                </a:schemeClr>
+              </a:solidFill>
+            </a:ln>
+          </p:spPr>
+          <p:style>
+            <a:lnRef idx="2">
+              <a:schemeClr val="accent1">
+                <a:shade val="50000"/>
+              </a:schemeClr>
+            </a:lnRef>
+            <a:fillRef idx="1">
+              <a:schemeClr val="accent1"/>
+            </a:fillRef>
+            <a:effectRef idx="0">
+              <a:schemeClr val="accent1"/>
+            </a:effectRef>
+            <a:fontRef idx="minor">
+              <a:schemeClr val="lt1"/>
+            </a:fontRef>
+          </p:style>
+          <p:txBody>
+            <a:bodyPr rtlCol="0" anchor="ctr"/>
+            <a:lstStyle/>
+            <a:p>
+              <a:pPr algn="ctr"/>
+              <a:endParaRPr lang="de-CH" sz="4400"/>
+            </a:p>
+          </p:txBody>
+        </p:sp>
+      </p:grpSp>
+      <p:sp>
+        <p:nvSpPr>
+          <p:cNvPr id="94" name="Wolke 93"/>
+          <p:cNvSpPr/>
+          <p:nvPr/>
+        </p:nvSpPr>
+        <p:spPr>
+          <a:xfrm>
+            <a:off x="8718470" y="437961"/>
+            <a:ext cx="5848568" cy="1706316"/>
+          </a:xfrm>
+          <a:prstGeom prst="cloud">
+            <a:avLst/>
+          </a:prstGeom>
+          <a:solidFill>
+            <a:schemeClr val="bg1"/>
+          </a:solidFill>
+          <a:ln>
+            <a:noFill/>
+          </a:ln>
+        </p:spPr>
+        <p:style>
+          <a:lnRef idx="2">
+            <a:schemeClr val="accent1">
+              <a:shade val="50000"/>
+            </a:schemeClr>
+          </a:lnRef>
+          <a:fillRef idx="1">
+            <a:schemeClr val="accent1"/>
+          </a:fillRef>
+          <a:effectRef idx="0">
+            <a:schemeClr val="accent1"/>
+          </a:effectRef>
+          <a:fontRef idx="minor">
+            <a:schemeClr val="lt1"/>
+          </a:fontRef>
+        </p:style>
+        <p:txBody>
+          <a:bodyPr rtlCol="0" anchor="ctr"/>
+          <a:lstStyle/>
+          <a:p>
+            <a:pPr algn="ctr"/>
+            <a:endParaRPr lang="de-CH"/>
+          </a:p>
+        </p:txBody>
+      </p:sp>
+      <p:sp>
+        <p:nvSpPr>
+          <p:cNvPr id="90" name="Wolke 89"/>
+          <p:cNvSpPr/>
+          <p:nvPr/>
+        </p:nvSpPr>
+        <p:spPr>
+          <a:xfrm>
+            <a:off x="-253621" y="2212928"/>
+            <a:ext cx="7496648" cy="4694993"/>
+          </a:xfrm>
+          <a:prstGeom prst="cloud">
+            <a:avLst/>
+          </a:prstGeom>
+          <a:solidFill>
+            <a:schemeClr val="bg1"/>
+          </a:solidFill>
+          <a:ln>
+            <a:noFill/>
+          </a:ln>
+        </p:spPr>
+        <p:style>
+          <a:lnRef idx="2">
+            <a:schemeClr val="accent1">
+              <a:shade val="50000"/>
+            </a:schemeClr>
+          </a:lnRef>
+          <a:fillRef idx="1">
+            <a:schemeClr val="accent1"/>
+          </a:fillRef>
+          <a:effectRef idx="0">
+            <a:schemeClr val="accent1"/>
+          </a:effectRef>
+          <a:fontRef idx="minor">
+            <a:schemeClr val="lt1"/>
+          </a:fontRef>
+        </p:style>
+        <p:txBody>
+          <a:bodyPr rtlCol="0" anchor="ctr"/>
+          <a:lstStyle/>
+          <a:p>
+            <a:pPr algn="ctr"/>
+            <a:r>
+              <a:rPr lang="de-CH" dirty="0" err="1" smtClean="0"/>
+              <a:t>zzzzzz</a:t>
+            </a:r>
+            <a:endParaRPr lang="de-CH" dirty="0"/>
+          </a:p>
+        </p:txBody>
+      </p:sp>
       <p:sp>
         <p:nvSpPr>
           <p:cNvPr id="2" name="Ellipse 1"/>
@@ -3533,52 +4194,6 @@
       </p:grpSp>
       <p:sp>
         <p:nvSpPr>
-          <p:cNvPr id="94" name="Wolke 93"/>
-          <p:cNvSpPr/>
-          <p:nvPr/>
-        </p:nvSpPr>
-        <p:spPr>
-          <a:xfrm>
-            <a:off x="8718470" y="437961"/>
-            <a:ext cx="5848568" cy="1706316"/>
-          </a:xfrm>
-          <a:prstGeom prst="cloud">
-            <a:avLst/>
-          </a:prstGeom>
-          <a:solidFill>
-            <a:schemeClr val="bg1"/>
-          </a:solidFill>
-          <a:ln>
-            <a:noFill/>
-          </a:ln>
-        </p:spPr>
-        <p:style>
-          <a:lnRef idx="2">
-            <a:schemeClr val="accent1">
-              <a:shade val="50000"/>
-            </a:schemeClr>
-          </a:lnRef>
-          <a:fillRef idx="1">
-            <a:schemeClr val="accent1"/>
-          </a:fillRef>
-          <a:effectRef idx="0">
-            <a:schemeClr val="accent1"/>
-          </a:effectRef>
-          <a:fontRef idx="minor">
-            <a:schemeClr val="lt1"/>
-          </a:fontRef>
-        </p:style>
-        <p:txBody>
-          <a:bodyPr rtlCol="0" anchor="ctr"/>
-          <a:lstStyle/>
-          <a:p>
-            <a:pPr algn="ctr"/>
-            <a:endParaRPr lang="de-CH"/>
-          </a:p>
-        </p:txBody>
-      </p:sp>
-      <p:sp>
-        <p:nvSpPr>
           <p:cNvPr id="93" name="Wolke 92"/>
           <p:cNvSpPr/>
           <p:nvPr/>
@@ -3625,56 +4240,6 @@
       </p:sp>
       <p:sp>
         <p:nvSpPr>
-          <p:cNvPr id="90" name="Wolke 89"/>
-          <p:cNvSpPr/>
-          <p:nvPr/>
-        </p:nvSpPr>
-        <p:spPr>
-          <a:xfrm>
-            <a:off x="-253621" y="2212928"/>
-            <a:ext cx="7496648" cy="4694993"/>
-          </a:xfrm>
-          <a:prstGeom prst="cloud">
-            <a:avLst/>
-          </a:prstGeom>
-          <a:solidFill>
-            <a:schemeClr val="bg1"/>
-          </a:solidFill>
-          <a:ln>
-            <a:noFill/>
-          </a:ln>
-        </p:spPr>
-        <p:style>
-          <a:lnRef idx="2">
-            <a:schemeClr val="accent1">
-              <a:shade val="50000"/>
-            </a:schemeClr>
-          </a:lnRef>
-          <a:fillRef idx="1">
-            <a:schemeClr val="accent1"/>
-          </a:fillRef>
-          <a:effectRef idx="0">
-            <a:schemeClr val="accent1"/>
-          </a:effectRef>
-          <a:fontRef idx="minor">
-            <a:schemeClr val="lt1"/>
-          </a:fontRef>
-        </p:style>
-        <p:txBody>
-          <a:bodyPr rtlCol="0" anchor="ctr"/>
-          <a:lstStyle/>
-          <a:p>
-            <a:pPr algn="ctr"/>
-            <a:r>
-              <a:rPr lang="de-CH" dirty="0" err="1" smtClean="0"/>
-              <a:t>zzzzzz</a:t>
-            </a:r>
-            <a:endParaRPr lang="de-CH" dirty="0"/>
-          </a:p>
-        </p:txBody>
-      </p:sp>
-      <p:sp>
-        <p:nvSpPr>
           <p:cNvPr id="88" name="Rechteck 87"/>
           <p:cNvSpPr/>
           <p:nvPr/>
@@ -3735,7 +4300,7 @@
         </p:nvSpPr>
         <p:spPr>
           <a:xfrm>
-            <a:off x="756423" y="3503607"/>
+            <a:off x="756423" y="4042087"/>
             <a:ext cx="102242" cy="1056818"/>
           </a:xfrm>
           <a:prstGeom prst="rect">
@@ -3787,7 +4352,7 @@
         </p:nvSpPr>
         <p:spPr>
           <a:xfrm>
-            <a:off x="467730" y="4305782"/>
+            <a:off x="467730" y="4844262"/>
             <a:ext cx="288694" cy="148348"/>
           </a:xfrm>
           <a:prstGeom prst="rect">
@@ -3839,7 +4404,7 @@
         </p:nvSpPr>
         <p:spPr>
           <a:xfrm>
-            <a:off x="9785110" y="2916820"/>
+            <a:off x="9785110" y="3455300"/>
             <a:ext cx="1215118" cy="1537311"/>
           </a:xfrm>
           <a:prstGeom prst="rect">
@@ -3891,7 +4456,7 @@
         </p:nvSpPr>
         <p:spPr>
           <a:xfrm>
-            <a:off x="10331385" y="2662740"/>
+            <a:off x="10331385" y="3201220"/>
             <a:ext cx="600759" cy="236401"/>
           </a:xfrm>
           <a:prstGeom prst="rect">
@@ -3944,8 +4509,8 @@
         </p:nvSpPr>
         <p:spPr>
           <a:xfrm>
-            <a:off x="0" y="5660020"/>
-            <a:ext cx="12192000" cy="1197979"/>
+            <a:off x="0" y="6198501"/>
+            <a:ext cx="12192000" cy="659500"/>
           </a:xfrm>
           <a:prstGeom prst="rect">
             <a:avLst/>
@@ -3985,7 +4550,7 @@
         </p:nvSpPr>
         <p:spPr>
           <a:xfrm rot="10800000">
-            <a:off x="379785" y="4461139"/>
+            <a:off x="379785" y="4999619"/>
             <a:ext cx="10866049" cy="599440"/>
           </a:xfrm>
           <a:prstGeom prst="trapezoid">
@@ -4036,7 +4601,7 @@
         </p:nvSpPr>
         <p:spPr>
           <a:xfrm rot="10800000">
-            <a:off x="527685" y="5060580"/>
+            <a:off x="527685" y="5599060"/>
             <a:ext cx="10568289" cy="599440"/>
           </a:xfrm>
           <a:prstGeom prst="trapezoid">
@@ -4084,7 +4649,7 @@
         </p:nvSpPr>
         <p:spPr>
           <a:xfrm>
-            <a:off x="11644131" y="4461139"/>
+            <a:off x="11644131" y="4999619"/>
             <a:ext cx="715477" cy="1190970"/>
           </a:xfrm>
           <a:prstGeom prst="rect">
@@ -4125,7 +4690,7 @@
         </p:nvSpPr>
         <p:spPr>
           <a:xfrm>
-            <a:off x="9949422" y="2426570"/>
+            <a:off x="9949422" y="2965050"/>
             <a:ext cx="381963" cy="483242"/>
           </a:xfrm>
           <a:prstGeom prst="rect">
@@ -4177,7 +4742,7 @@
         </p:nvSpPr>
         <p:spPr>
           <a:xfrm>
-            <a:off x="9785110" y="3078189"/>
+            <a:off x="9785110" y="3616669"/>
             <a:ext cx="903966" cy="138349"/>
           </a:xfrm>
           <a:prstGeom prst="rect">
@@ -4231,7 +4796,7 @@
         </p:nvSpPr>
         <p:spPr>
           <a:xfrm>
-            <a:off x="9785110" y="3377907"/>
+            <a:off x="9785110" y="3916387"/>
             <a:ext cx="486136" cy="125700"/>
           </a:xfrm>
           <a:prstGeom prst="rect">
@@ -4285,7 +4850,7 @@
         </p:nvSpPr>
         <p:spPr>
           <a:xfrm>
-            <a:off x="10774632" y="3377907"/>
+            <a:off x="10774632" y="3916387"/>
             <a:ext cx="157512" cy="137901"/>
           </a:xfrm>
           <a:prstGeom prst="rect">
@@ -4339,7 +4904,7 @@
         </p:nvSpPr>
         <p:spPr>
           <a:xfrm>
-            <a:off x="10774632" y="3769888"/>
+            <a:off x="10774632" y="4308368"/>
             <a:ext cx="157512" cy="137901"/>
           </a:xfrm>
           <a:prstGeom prst="rect">
@@ -4393,7 +4958,7 @@
         </p:nvSpPr>
         <p:spPr>
           <a:xfrm>
-            <a:off x="10395395" y="3769888"/>
+            <a:off x="10395395" y="4308368"/>
             <a:ext cx="157512" cy="137901"/>
           </a:xfrm>
           <a:prstGeom prst="rect">
@@ -4447,7 +5012,7 @@
         </p:nvSpPr>
         <p:spPr>
           <a:xfrm>
-            <a:off x="9949422" y="3792748"/>
+            <a:off x="9949422" y="4331228"/>
             <a:ext cx="157512" cy="137901"/>
           </a:xfrm>
           <a:prstGeom prst="rect">
@@ -4501,7 +5066,7 @@
         </p:nvSpPr>
         <p:spPr>
           <a:xfrm>
-            <a:off x="10638564" y="2433418"/>
+            <a:off x="10638564" y="2971898"/>
             <a:ext cx="136068" cy="204565"/>
           </a:xfrm>
           <a:prstGeom prst="rect">
@@ -4554,7 +5119,7 @@
         </p:nvSpPr>
         <p:spPr>
           <a:xfrm>
-            <a:off x="9738216" y="5501945"/>
+            <a:off x="9738216" y="6040425"/>
             <a:ext cx="278934" cy="62850"/>
           </a:xfrm>
           <a:prstGeom prst="rect">
@@ -4607,7 +5172,7 @@
         </p:nvSpPr>
         <p:spPr>
           <a:xfrm>
-            <a:off x="9738216" y="5349453"/>
+            <a:off x="9738216" y="5887933"/>
             <a:ext cx="278934" cy="62850"/>
           </a:xfrm>
           <a:prstGeom prst="rect">
@@ -4660,7 +5225,7 @@
         </p:nvSpPr>
         <p:spPr>
           <a:xfrm>
-            <a:off x="9734310" y="4714578"/>
+            <a:off x="9734310" y="5253058"/>
             <a:ext cx="278934" cy="62850"/>
           </a:xfrm>
           <a:prstGeom prst="rect">
@@ -4713,7 +5278,7 @@
         </p:nvSpPr>
         <p:spPr>
           <a:xfrm>
-            <a:off x="9734310" y="4874598"/>
+            <a:off x="9734310" y="5413078"/>
             <a:ext cx="278934" cy="62850"/>
           </a:xfrm>
           <a:prstGeom prst="rect">
@@ -4766,7 +5331,7 @@
         </p:nvSpPr>
         <p:spPr>
           <a:xfrm>
-            <a:off x="9734310" y="5032606"/>
+            <a:off x="9734310" y="5571086"/>
             <a:ext cx="278934" cy="62850"/>
           </a:xfrm>
           <a:prstGeom prst="rect">
@@ -4819,7 +5384,7 @@
         </p:nvSpPr>
         <p:spPr>
           <a:xfrm>
-            <a:off x="9738216" y="5190614"/>
+            <a:off x="9738216" y="5729094"/>
             <a:ext cx="278934" cy="62850"/>
           </a:xfrm>
           <a:prstGeom prst="rect">
@@ -4872,7 +5437,7 @@
         </p:nvSpPr>
         <p:spPr>
           <a:xfrm>
-            <a:off x="9734310" y="4562086"/>
+            <a:off x="9734310" y="5100566"/>
             <a:ext cx="278934" cy="62850"/>
           </a:xfrm>
           <a:prstGeom prst="rect">
@@ -4925,7 +5490,7 @@
         </p:nvSpPr>
         <p:spPr>
           <a:xfrm>
-            <a:off x="920736" y="3448377"/>
+            <a:off x="920736" y="3986857"/>
             <a:ext cx="975360" cy="975360"/>
           </a:xfrm>
           <a:prstGeom prst="rect">
@@ -4979,7 +5544,7 @@
         </p:nvSpPr>
         <p:spPr>
           <a:xfrm>
-            <a:off x="3870420" y="3448363"/>
+            <a:off x="3870420" y="3986843"/>
             <a:ext cx="2926080" cy="975360"/>
           </a:xfrm>
           <a:prstGeom prst="rect">
@@ -5033,7 +5598,7 @@
         </p:nvSpPr>
         <p:spPr>
           <a:xfrm>
-            <a:off x="1930223" y="3448377"/>
+            <a:off x="1930223" y="3986857"/>
             <a:ext cx="1910790" cy="975360"/>
           </a:xfrm>
           <a:prstGeom prst="rect">
@@ -5085,7 +5650,7 @@
         </p:nvSpPr>
         <p:spPr>
           <a:xfrm>
-            <a:off x="8723487" y="3458985"/>
+            <a:off x="8723487" y="3997465"/>
             <a:ext cx="975360" cy="975360"/>
           </a:xfrm>
           <a:prstGeom prst="rect">
@@ -5137,7 +5702,7 @@
         </p:nvSpPr>
         <p:spPr>
           <a:xfrm>
-            <a:off x="920736" y="2450506"/>
+            <a:off x="920736" y="2988986"/>
             <a:ext cx="1910790" cy="975360"/>
           </a:xfrm>
           <a:prstGeom prst="rect">
@@ -7388,7 +7953,7 @@
         </p:nvSpPr>
         <p:spPr>
           <a:xfrm>
-            <a:off x="3877534" y="2433321"/>
+            <a:off x="3877534" y="2971801"/>
             <a:ext cx="1910790" cy="975360"/>
           </a:xfrm>
           <a:prstGeom prst="rect">
@@ -7578,6 +8143,1545 @@
     <p:extLst>
       <p:ext uri="{BB962C8B-B14F-4D97-AF65-F5344CB8AC3E}">
         <p14:creationId xmlns:p14="http://schemas.microsoft.com/office/powerpoint/2010/main" val="838348647"/>
+      </p:ext>
+    </p:extLst>
+  </p:cSld>
+  <p:clrMapOvr>
+    <a:masterClrMapping/>
+  </p:clrMapOvr>
+  <p:timing>
+    <p:tnLst>
+      <p:par>
+        <p:cTn id="1" dur="indefinite" restart="never" nodeType="tmRoot"/>
+      </p:par>
+    </p:tnLst>
+  </p:timing>
+</p:sld>
+</file>
+
+<file path=ppt/slides/slide2.xml><?xml version="1.0" encoding="utf-8"?>
+<p:sld xmlns:a="http://schemas.openxmlformats.org/drawingml/2006/main" xmlns:r="http://schemas.openxmlformats.org/officeDocument/2006/relationships" xmlns:p="http://schemas.openxmlformats.org/presentationml/2006/main">
+  <p:cSld>
+    <p:spTree>
+      <p:nvGrpSpPr>
+        <p:cNvPr id="1" name=""/>
+        <p:cNvGrpSpPr/>
+        <p:nvPr/>
+      </p:nvGrpSpPr>
+      <p:grpSpPr>
+        <a:xfrm>
+          <a:off x="0" y="0"/>
+          <a:ext cx="0" cy="0"/>
+          <a:chOff x="0" y="0"/>
+          <a:chExt cx="0" cy="0"/>
+        </a:xfrm>
+      </p:grpSpPr>
+      <p:grpSp>
+        <p:nvGrpSpPr>
+          <p:cNvPr id="46" name="Gruppieren 45"/>
+          <p:cNvGrpSpPr/>
+          <p:nvPr/>
+        </p:nvGrpSpPr>
+        <p:grpSpPr>
+          <a:xfrm>
+            <a:off x="9771850" y="3983821"/>
+            <a:ext cx="1096337" cy="1081059"/>
+            <a:chOff x="9346903" y="3190240"/>
+            <a:chExt cx="1941231" cy="1914179"/>
+          </a:xfrm>
+        </p:grpSpPr>
+        <p:grpSp>
+          <p:nvGrpSpPr>
+            <p:cNvPr id="34" name="Gruppieren 33"/>
+            <p:cNvGrpSpPr/>
+            <p:nvPr/>
+          </p:nvGrpSpPr>
+          <p:grpSpPr>
+            <a:xfrm>
+              <a:off x="9346903" y="4970201"/>
+              <a:ext cx="1941231" cy="105876"/>
+              <a:chOff x="6804179" y="1612321"/>
+              <a:chExt cx="1941231" cy="105876"/>
+            </a:xfrm>
+          </p:grpSpPr>
+          <p:sp>
+            <p:nvSpPr>
+              <p:cNvPr id="35" name="Rechteck 34"/>
+              <p:cNvSpPr/>
+              <p:nvPr/>
+            </p:nvSpPr>
+            <p:spPr>
+              <a:xfrm rot="18000000">
+                <a:off x="8188940" y="1155076"/>
+                <a:ext cx="99225" cy="1013715"/>
+              </a:xfrm>
+              <a:prstGeom prst="rect">
+                <a:avLst/>
+              </a:prstGeom>
+              <a:solidFill>
+                <a:schemeClr val="bg1">
+                  <a:lumMod val="50000"/>
+                </a:schemeClr>
+              </a:solidFill>
+              <a:ln w="38100">
+                <a:solidFill>
+                  <a:schemeClr val="tx1">
+                    <a:lumMod val="75000"/>
+                    <a:lumOff val="25000"/>
+                  </a:schemeClr>
+                </a:solidFill>
+              </a:ln>
+            </p:spPr>
+            <p:style>
+              <a:lnRef idx="2">
+                <a:schemeClr val="accent1">
+                  <a:shade val="50000"/>
+                </a:schemeClr>
+              </a:lnRef>
+              <a:fillRef idx="1">
+                <a:schemeClr val="accent1"/>
+              </a:fillRef>
+              <a:effectRef idx="0">
+                <a:schemeClr val="accent1"/>
+              </a:effectRef>
+              <a:fontRef idx="minor">
+                <a:schemeClr val="lt1"/>
+              </a:fontRef>
+            </p:style>
+            <p:txBody>
+              <a:bodyPr rtlCol="0" anchor="ctr"/>
+              <a:lstStyle/>
+              <a:p>
+                <a:pPr algn="ctr"/>
+                <a:endParaRPr lang="de-CH" sz="4400"/>
+              </a:p>
+            </p:txBody>
+          </p:sp>
+          <p:sp>
+            <p:nvSpPr>
+              <p:cNvPr id="36" name="Rechteck 35"/>
+              <p:cNvSpPr/>
+              <p:nvPr/>
+            </p:nvSpPr>
+            <p:spPr>
+              <a:xfrm rot="3600000">
+                <a:off x="7261424" y="1161727"/>
+                <a:ext cx="99225" cy="1013715"/>
+              </a:xfrm>
+              <a:prstGeom prst="rect">
+                <a:avLst/>
+              </a:prstGeom>
+              <a:solidFill>
+                <a:schemeClr val="bg1">
+                  <a:lumMod val="50000"/>
+                </a:schemeClr>
+              </a:solidFill>
+              <a:ln w="38100">
+                <a:solidFill>
+                  <a:schemeClr val="tx1">
+                    <a:lumMod val="75000"/>
+                    <a:lumOff val="25000"/>
+                  </a:schemeClr>
+                </a:solidFill>
+              </a:ln>
+            </p:spPr>
+            <p:style>
+              <a:lnRef idx="2">
+                <a:schemeClr val="accent1">
+                  <a:shade val="50000"/>
+                </a:schemeClr>
+              </a:lnRef>
+              <a:fillRef idx="1">
+                <a:schemeClr val="accent1"/>
+              </a:fillRef>
+              <a:effectRef idx="0">
+                <a:schemeClr val="accent1"/>
+              </a:effectRef>
+              <a:fontRef idx="minor">
+                <a:schemeClr val="lt1"/>
+              </a:fontRef>
+            </p:style>
+            <p:txBody>
+              <a:bodyPr rtlCol="0" anchor="ctr"/>
+              <a:lstStyle/>
+              <a:p>
+                <a:pPr algn="ctr"/>
+                <a:endParaRPr lang="de-CH" sz="4400"/>
+              </a:p>
+            </p:txBody>
+          </p:sp>
+        </p:grpSp>
+        <p:grpSp>
+          <p:nvGrpSpPr>
+            <p:cNvPr id="45" name="Gruppieren 44"/>
+            <p:cNvGrpSpPr/>
+            <p:nvPr/>
+          </p:nvGrpSpPr>
+          <p:grpSpPr>
+            <a:xfrm>
+              <a:off x="9964417" y="3190240"/>
+              <a:ext cx="706205" cy="1914179"/>
+              <a:chOff x="9964417" y="3190240"/>
+              <a:chExt cx="706205" cy="1914179"/>
+            </a:xfrm>
+          </p:grpSpPr>
+          <p:sp>
+            <p:nvSpPr>
+              <p:cNvPr id="37" name="Rechteck 36"/>
+              <p:cNvSpPr/>
+              <p:nvPr/>
+            </p:nvSpPr>
+            <p:spPr>
+              <a:xfrm>
+                <a:off x="10248649" y="4232022"/>
+                <a:ext cx="137743" cy="272956"/>
+              </a:xfrm>
+              <a:prstGeom prst="rect">
+                <a:avLst/>
+              </a:prstGeom>
+              <a:solidFill>
+                <a:schemeClr val="bg1">
+                  <a:lumMod val="50000"/>
+                </a:schemeClr>
+              </a:solidFill>
+              <a:ln w="38100">
+                <a:solidFill>
+                  <a:schemeClr val="tx1">
+                    <a:lumMod val="75000"/>
+                    <a:lumOff val="25000"/>
+                  </a:schemeClr>
+                </a:solidFill>
+              </a:ln>
+            </p:spPr>
+            <p:style>
+              <a:lnRef idx="2">
+                <a:schemeClr val="accent1">
+                  <a:shade val="50000"/>
+                </a:schemeClr>
+              </a:lnRef>
+              <a:fillRef idx="1">
+                <a:schemeClr val="accent1"/>
+              </a:fillRef>
+              <a:effectRef idx="0">
+                <a:schemeClr val="accent1"/>
+              </a:effectRef>
+              <a:fontRef idx="minor">
+                <a:schemeClr val="lt1"/>
+              </a:fontRef>
+            </p:style>
+            <p:txBody>
+              <a:bodyPr rtlCol="0" anchor="ctr"/>
+              <a:lstStyle/>
+              <a:p>
+                <a:pPr algn="ctr"/>
+                <a:endParaRPr lang="de-CH" sz="4400"/>
+              </a:p>
+            </p:txBody>
+          </p:sp>
+          <p:sp>
+            <p:nvSpPr>
+              <p:cNvPr id="42" name="Trapezoid 41"/>
+              <p:cNvSpPr/>
+              <p:nvPr/>
+            </p:nvSpPr>
+            <p:spPr>
+              <a:xfrm>
+                <a:off x="10086339" y="4504979"/>
+                <a:ext cx="467360" cy="599440"/>
+              </a:xfrm>
+              <a:prstGeom prst="trapezoid">
+                <a:avLst/>
+              </a:prstGeom>
+              <a:solidFill>
+                <a:srgbClr val="FDC527"/>
+              </a:solidFill>
+              <a:ln w="38100">
+                <a:solidFill>
+                  <a:schemeClr val="accent4">
+                    <a:lumMod val="50000"/>
+                  </a:schemeClr>
+                </a:solidFill>
+              </a:ln>
+            </p:spPr>
+            <p:style>
+              <a:lnRef idx="2">
+                <a:schemeClr val="accent1">
+                  <a:shade val="50000"/>
+                </a:schemeClr>
+              </a:lnRef>
+              <a:fillRef idx="1">
+                <a:schemeClr val="accent1"/>
+              </a:fillRef>
+              <a:effectRef idx="0">
+                <a:schemeClr val="accent1"/>
+              </a:effectRef>
+              <a:fontRef idx="minor">
+                <a:schemeClr val="lt1"/>
+              </a:fontRef>
+            </p:style>
+            <p:txBody>
+              <a:bodyPr rtlCol="0" anchor="ctr"/>
+              <a:lstStyle/>
+              <a:p>
+                <a:pPr algn="ctr"/>
+                <a:endParaRPr lang="de-CH" sz="4400"/>
+              </a:p>
+            </p:txBody>
+          </p:sp>
+          <p:sp>
+            <p:nvSpPr>
+              <p:cNvPr id="43" name="Trapezoid 42"/>
+              <p:cNvSpPr/>
+              <p:nvPr/>
+            </p:nvSpPr>
+            <p:spPr>
+              <a:xfrm flipV="1">
+                <a:off x="9964417" y="3978022"/>
+                <a:ext cx="706205" cy="254000"/>
+              </a:xfrm>
+              <a:prstGeom prst="trapezoid">
+                <a:avLst/>
+              </a:prstGeom>
+              <a:solidFill>
+                <a:srgbClr val="FDC527"/>
+              </a:solidFill>
+              <a:ln w="38100">
+                <a:solidFill>
+                  <a:schemeClr val="accent4">
+                    <a:lumMod val="50000"/>
+                  </a:schemeClr>
+                </a:solidFill>
+              </a:ln>
+            </p:spPr>
+            <p:style>
+              <a:lnRef idx="2">
+                <a:schemeClr val="accent1">
+                  <a:shade val="50000"/>
+                </a:schemeClr>
+              </a:lnRef>
+              <a:fillRef idx="1">
+                <a:schemeClr val="accent1"/>
+              </a:fillRef>
+              <a:effectRef idx="0">
+                <a:schemeClr val="accent1"/>
+              </a:effectRef>
+              <a:fontRef idx="minor">
+                <a:schemeClr val="lt1"/>
+              </a:fontRef>
+            </p:style>
+            <p:txBody>
+              <a:bodyPr rtlCol="0" anchor="ctr"/>
+              <a:lstStyle/>
+              <a:p>
+                <a:pPr algn="ctr"/>
+                <a:endParaRPr lang="de-CH" sz="4400"/>
+              </a:p>
+            </p:txBody>
+          </p:sp>
+          <p:cxnSp>
+            <p:nvCxnSpPr>
+              <p:cNvPr id="44" name="Gerader Verbinder 43"/>
+              <p:cNvCxnSpPr>
+                <a:stCxn id="43" idx="2"/>
+              </p:cNvCxnSpPr>
+              <p:nvPr/>
+            </p:nvCxnSpPr>
+            <p:spPr>
+              <a:xfrm flipV="1">
+                <a:off x="10317520" y="3190240"/>
+                <a:ext cx="8600" cy="787782"/>
+              </a:xfrm>
+              <a:prstGeom prst="line">
+                <a:avLst/>
+              </a:prstGeom>
+              <a:ln w="76200">
+                <a:solidFill>
+                  <a:schemeClr val="bg2">
+                    <a:lumMod val="25000"/>
+                  </a:schemeClr>
+                </a:solidFill>
+              </a:ln>
+            </p:spPr>
+            <p:style>
+              <a:lnRef idx="1">
+                <a:schemeClr val="accent1"/>
+              </a:lnRef>
+              <a:fillRef idx="0">
+                <a:schemeClr val="accent1"/>
+              </a:fillRef>
+              <a:effectRef idx="0">
+                <a:schemeClr val="accent1"/>
+              </a:effectRef>
+              <a:fontRef idx="minor">
+                <a:schemeClr val="tx1"/>
+              </a:fontRef>
+            </p:style>
+          </p:cxnSp>
+        </p:grpSp>
+      </p:grpSp>
+      <p:grpSp>
+        <p:nvGrpSpPr>
+          <p:cNvPr id="31" name="Gruppieren 30"/>
+          <p:cNvGrpSpPr/>
+          <p:nvPr/>
+        </p:nvGrpSpPr>
+        <p:grpSpPr>
+          <a:xfrm>
+            <a:off x="6773799" y="1576761"/>
+            <a:ext cx="1941231" cy="105876"/>
+            <a:chOff x="6804179" y="1612321"/>
+            <a:chExt cx="1941231" cy="105876"/>
+          </a:xfrm>
+        </p:grpSpPr>
+        <p:sp>
+          <p:nvSpPr>
+            <p:cNvPr id="30" name="Rechteck 29"/>
+            <p:cNvSpPr/>
+            <p:nvPr/>
+          </p:nvSpPr>
+          <p:spPr>
+            <a:xfrm rot="18000000">
+              <a:off x="8188940" y="1155076"/>
+              <a:ext cx="99225" cy="1013715"/>
+            </a:xfrm>
+            <a:prstGeom prst="rect">
+              <a:avLst/>
+            </a:prstGeom>
+            <a:solidFill>
+              <a:schemeClr val="bg1">
+                <a:lumMod val="50000"/>
+              </a:schemeClr>
+            </a:solidFill>
+            <a:ln w="38100">
+              <a:solidFill>
+                <a:schemeClr val="tx1">
+                  <a:lumMod val="75000"/>
+                  <a:lumOff val="25000"/>
+                </a:schemeClr>
+              </a:solidFill>
+            </a:ln>
+          </p:spPr>
+          <p:style>
+            <a:lnRef idx="2">
+              <a:schemeClr val="accent1">
+                <a:shade val="50000"/>
+              </a:schemeClr>
+            </a:lnRef>
+            <a:fillRef idx="1">
+              <a:schemeClr val="accent1"/>
+            </a:fillRef>
+            <a:effectRef idx="0">
+              <a:schemeClr val="accent1"/>
+            </a:effectRef>
+            <a:fontRef idx="minor">
+              <a:schemeClr val="lt1"/>
+            </a:fontRef>
+          </p:style>
+          <p:txBody>
+            <a:bodyPr rtlCol="0" anchor="ctr"/>
+            <a:lstStyle/>
+            <a:p>
+              <a:pPr algn="ctr"/>
+              <a:endParaRPr lang="de-CH" sz="4400"/>
+            </a:p>
+          </p:txBody>
+        </p:sp>
+        <p:sp>
+          <p:nvSpPr>
+            <p:cNvPr id="29" name="Rechteck 28"/>
+            <p:cNvSpPr/>
+            <p:nvPr/>
+          </p:nvSpPr>
+          <p:spPr>
+            <a:xfrm rot="3600000">
+              <a:off x="7261424" y="1161727"/>
+              <a:ext cx="99225" cy="1013715"/>
+            </a:xfrm>
+            <a:prstGeom prst="rect">
+              <a:avLst/>
+            </a:prstGeom>
+            <a:solidFill>
+              <a:schemeClr val="bg1">
+                <a:lumMod val="50000"/>
+              </a:schemeClr>
+            </a:solidFill>
+            <a:ln w="38100">
+              <a:solidFill>
+                <a:schemeClr val="tx1">
+                  <a:lumMod val="75000"/>
+                  <a:lumOff val="25000"/>
+                </a:schemeClr>
+              </a:solidFill>
+            </a:ln>
+          </p:spPr>
+          <p:style>
+            <a:lnRef idx="2">
+              <a:schemeClr val="accent1">
+                <a:shade val="50000"/>
+              </a:schemeClr>
+            </a:lnRef>
+            <a:fillRef idx="1">
+              <a:schemeClr val="accent1"/>
+            </a:fillRef>
+            <a:effectRef idx="0">
+              <a:schemeClr val="accent1"/>
+            </a:effectRef>
+            <a:fontRef idx="minor">
+              <a:schemeClr val="lt1"/>
+            </a:fontRef>
+          </p:style>
+          <p:txBody>
+            <a:bodyPr rtlCol="0" anchor="ctr"/>
+            <a:lstStyle/>
+            <a:p>
+              <a:pPr algn="ctr"/>
+              <a:endParaRPr lang="de-CH" sz="4400"/>
+            </a:p>
+          </p:txBody>
+        </p:sp>
+      </p:grpSp>
+      <p:sp>
+        <p:nvSpPr>
+          <p:cNvPr id="28" name="Rechteck 27"/>
+          <p:cNvSpPr/>
+          <p:nvPr/>
+        </p:nvSpPr>
+        <p:spPr>
+          <a:xfrm>
+            <a:off x="7675545" y="838582"/>
+            <a:ext cx="137743" cy="272956"/>
+          </a:xfrm>
+          <a:prstGeom prst="rect">
+            <a:avLst/>
+          </a:prstGeom>
+          <a:solidFill>
+            <a:schemeClr val="bg1">
+              <a:lumMod val="50000"/>
+            </a:schemeClr>
+          </a:solidFill>
+          <a:ln w="38100">
+            <a:solidFill>
+              <a:schemeClr val="tx1">
+                <a:lumMod val="75000"/>
+                <a:lumOff val="25000"/>
+              </a:schemeClr>
+            </a:solidFill>
+          </a:ln>
+        </p:spPr>
+        <p:style>
+          <a:lnRef idx="2">
+            <a:schemeClr val="accent1">
+              <a:shade val="50000"/>
+            </a:schemeClr>
+          </a:lnRef>
+          <a:fillRef idx="1">
+            <a:schemeClr val="accent1"/>
+          </a:fillRef>
+          <a:effectRef idx="0">
+            <a:schemeClr val="accent1"/>
+          </a:effectRef>
+          <a:fontRef idx="minor">
+            <a:schemeClr val="lt1"/>
+          </a:fontRef>
+        </p:style>
+        <p:txBody>
+          <a:bodyPr rtlCol="0" anchor="ctr"/>
+          <a:lstStyle/>
+          <a:p>
+            <a:pPr algn="ctr"/>
+            <a:endParaRPr lang="de-CH" sz="4400"/>
+          </a:p>
+        </p:txBody>
+      </p:sp>
+      <p:grpSp>
+        <p:nvGrpSpPr>
+          <p:cNvPr id="11" name="Gruppieren 10"/>
+          <p:cNvGrpSpPr/>
+          <p:nvPr/>
+        </p:nvGrpSpPr>
+        <p:grpSpPr>
+          <a:xfrm>
+            <a:off x="1364474" y="1883508"/>
+            <a:ext cx="3540266" cy="2710596"/>
+            <a:chOff x="2715754" y="2391508"/>
+            <a:chExt cx="2720224" cy="2710596"/>
+          </a:xfrm>
+          <a:solidFill>
+            <a:schemeClr val="accent4">
+              <a:lumMod val="75000"/>
+            </a:schemeClr>
+          </a:solidFill>
+        </p:grpSpPr>
+        <p:grpSp>
+          <p:nvGrpSpPr>
+            <p:cNvPr id="10" name="Gruppieren 9"/>
+            <p:cNvGrpSpPr/>
+            <p:nvPr/>
+          </p:nvGrpSpPr>
+          <p:grpSpPr>
+            <a:xfrm>
+              <a:off x="2715754" y="4059297"/>
+              <a:ext cx="2720224" cy="97662"/>
+              <a:chOff x="2715754" y="4059297"/>
+              <a:chExt cx="2720224" cy="97662"/>
+            </a:xfrm>
+            <a:grpFill/>
+          </p:grpSpPr>
+          <p:sp>
+            <p:nvSpPr>
+              <p:cNvPr id="8" name="Rechteck 7"/>
+              <p:cNvSpPr/>
+              <p:nvPr/>
+            </p:nvSpPr>
+            <p:spPr>
+              <a:xfrm rot="3600000">
+                <a:off x="4031849" y="2752830"/>
+                <a:ext cx="97662" cy="2710596"/>
+              </a:xfrm>
+              <a:prstGeom prst="rect">
+                <a:avLst/>
+              </a:prstGeom>
+              <a:grpFill/>
+              <a:ln w="38100">
+                <a:solidFill>
+                  <a:schemeClr val="accent4">
+                    <a:lumMod val="50000"/>
+                  </a:schemeClr>
+                </a:solidFill>
+              </a:ln>
+            </p:spPr>
+            <p:style>
+              <a:lnRef idx="2">
+                <a:schemeClr val="accent1">
+                  <a:shade val="50000"/>
+                </a:schemeClr>
+              </a:lnRef>
+              <a:fillRef idx="1">
+                <a:schemeClr val="accent1"/>
+              </a:fillRef>
+              <a:effectRef idx="0">
+                <a:schemeClr val="accent1"/>
+              </a:effectRef>
+              <a:fontRef idx="minor">
+                <a:schemeClr val="lt1"/>
+              </a:fontRef>
+            </p:style>
+            <p:txBody>
+              <a:bodyPr rtlCol="0" anchor="ctr"/>
+              <a:lstStyle/>
+              <a:p>
+                <a:pPr algn="ctr"/>
+                <a:endParaRPr lang="de-CH" sz="4400"/>
+              </a:p>
+            </p:txBody>
+          </p:sp>
+          <p:sp>
+            <p:nvSpPr>
+              <p:cNvPr id="9" name="Rechteck 8"/>
+              <p:cNvSpPr/>
+              <p:nvPr/>
+            </p:nvSpPr>
+            <p:spPr>
+              <a:xfrm rot="7200000">
+                <a:off x="4022221" y="2752830"/>
+                <a:ext cx="97662" cy="2710596"/>
+              </a:xfrm>
+              <a:prstGeom prst="rect">
+                <a:avLst/>
+              </a:prstGeom>
+              <a:grpFill/>
+              <a:ln w="38100">
+                <a:solidFill>
+                  <a:schemeClr val="accent4">
+                    <a:lumMod val="50000"/>
+                  </a:schemeClr>
+                </a:solidFill>
+              </a:ln>
+            </p:spPr>
+            <p:style>
+              <a:lnRef idx="2">
+                <a:schemeClr val="accent1">
+                  <a:shade val="50000"/>
+                </a:schemeClr>
+              </a:lnRef>
+              <a:fillRef idx="1">
+                <a:schemeClr val="accent1"/>
+              </a:fillRef>
+              <a:effectRef idx="0">
+                <a:schemeClr val="accent1"/>
+              </a:effectRef>
+              <a:fontRef idx="minor">
+                <a:schemeClr val="lt1"/>
+              </a:fontRef>
+            </p:style>
+            <p:txBody>
+              <a:bodyPr rtlCol="0" anchor="ctr"/>
+              <a:lstStyle/>
+              <a:p>
+                <a:pPr algn="ctr"/>
+                <a:endParaRPr lang="de-CH" sz="4400"/>
+              </a:p>
+            </p:txBody>
+          </p:sp>
+        </p:grpSp>
+        <p:sp>
+          <p:nvSpPr>
+            <p:cNvPr id="7" name="Rechteck 6"/>
+            <p:cNvSpPr/>
+            <p:nvPr/>
+          </p:nvSpPr>
+          <p:spPr>
+            <a:xfrm>
+              <a:off x="5191516" y="2391508"/>
+              <a:ext cx="201685" cy="2710596"/>
+            </a:xfrm>
+            <a:prstGeom prst="rect">
+              <a:avLst/>
+            </a:prstGeom>
+            <a:grpFill/>
+            <a:ln w="38100">
+              <a:solidFill>
+                <a:schemeClr val="accent4">
+                  <a:lumMod val="50000"/>
+                </a:schemeClr>
+              </a:solidFill>
+            </a:ln>
+          </p:spPr>
+          <p:style>
+            <a:lnRef idx="2">
+              <a:schemeClr val="accent1">
+                <a:shade val="50000"/>
+              </a:schemeClr>
+            </a:lnRef>
+            <a:fillRef idx="1">
+              <a:schemeClr val="accent1"/>
+            </a:fillRef>
+            <a:effectRef idx="0">
+              <a:schemeClr val="accent1"/>
+            </a:effectRef>
+            <a:fontRef idx="minor">
+              <a:schemeClr val="lt1"/>
+            </a:fontRef>
+          </p:style>
+          <p:txBody>
+            <a:bodyPr rtlCol="0" anchor="ctr"/>
+            <a:lstStyle/>
+            <a:p>
+              <a:pPr algn="ctr"/>
+              <a:endParaRPr lang="de-CH" sz="4400"/>
+            </a:p>
+          </p:txBody>
+        </p:sp>
+        <p:sp>
+          <p:nvSpPr>
+            <p:cNvPr id="6" name="Rechteck 5"/>
+            <p:cNvSpPr/>
+            <p:nvPr/>
+          </p:nvSpPr>
+          <p:spPr>
+            <a:xfrm>
+              <a:off x="2758531" y="2391508"/>
+              <a:ext cx="201685" cy="2710596"/>
+            </a:xfrm>
+            <a:prstGeom prst="rect">
+              <a:avLst/>
+            </a:prstGeom>
+            <a:grpFill/>
+            <a:ln w="38100">
+              <a:solidFill>
+                <a:schemeClr val="accent4">
+                  <a:lumMod val="50000"/>
+                </a:schemeClr>
+              </a:solidFill>
+            </a:ln>
+          </p:spPr>
+          <p:style>
+            <a:lnRef idx="2">
+              <a:schemeClr val="accent1">
+                <a:shade val="50000"/>
+              </a:schemeClr>
+            </a:lnRef>
+            <a:fillRef idx="1">
+              <a:schemeClr val="accent1"/>
+            </a:fillRef>
+            <a:effectRef idx="0">
+              <a:schemeClr val="accent1"/>
+            </a:effectRef>
+            <a:fontRef idx="minor">
+              <a:schemeClr val="lt1"/>
+            </a:fontRef>
+          </p:style>
+          <p:txBody>
+            <a:bodyPr rtlCol="0" anchor="ctr"/>
+            <a:lstStyle/>
+            <a:p>
+              <a:pPr algn="ctr"/>
+              <a:endParaRPr lang="de-CH" sz="4400"/>
+            </a:p>
+          </p:txBody>
+        </p:sp>
+      </p:grpSp>
+      <p:sp>
+        <p:nvSpPr>
+          <p:cNvPr id="2" name="Rechteck 1"/>
+          <p:cNvSpPr/>
+          <p:nvPr/>
+        </p:nvSpPr>
+        <p:spPr>
+          <a:xfrm>
+            <a:off x="1279661" y="2209321"/>
+            <a:ext cx="3731759" cy="345056"/>
+          </a:xfrm>
+          <a:prstGeom prst="rect">
+            <a:avLst/>
+          </a:prstGeom>
+          <a:solidFill>
+            <a:srgbClr val="FDC527"/>
+          </a:solidFill>
+          <a:ln w="38100">
+            <a:solidFill>
+              <a:schemeClr val="accent4">
+                <a:lumMod val="50000"/>
+              </a:schemeClr>
+            </a:solidFill>
+          </a:ln>
+        </p:spPr>
+        <p:style>
+          <a:lnRef idx="2">
+            <a:schemeClr val="accent1">
+              <a:shade val="50000"/>
+            </a:schemeClr>
+          </a:lnRef>
+          <a:fillRef idx="1">
+            <a:schemeClr val="accent1"/>
+          </a:fillRef>
+          <a:effectRef idx="0">
+            <a:schemeClr val="accent1"/>
+          </a:effectRef>
+          <a:fontRef idx="minor">
+            <a:schemeClr val="lt1"/>
+          </a:fontRef>
+        </p:style>
+        <p:txBody>
+          <a:bodyPr rtlCol="0" anchor="ctr"/>
+          <a:lstStyle/>
+          <a:p>
+            <a:pPr algn="ctr"/>
+            <a:endParaRPr lang="de-CH" sz="4400"/>
+          </a:p>
+        </p:txBody>
+      </p:sp>
+      <p:sp>
+        <p:nvSpPr>
+          <p:cNvPr id="3" name="Rechteck 2"/>
+          <p:cNvSpPr/>
+          <p:nvPr/>
+        </p:nvSpPr>
+        <p:spPr>
+          <a:xfrm>
+            <a:off x="2184044" y="2554376"/>
+            <a:ext cx="1910790" cy="975360"/>
+          </a:xfrm>
+          <a:prstGeom prst="rect">
+            <a:avLst/>
+          </a:prstGeom>
+          <a:solidFill>
+            <a:srgbClr val="C00000"/>
+          </a:solidFill>
+          <a:ln w="38100">
+            <a:solidFill>
+              <a:srgbClr val="800000"/>
+            </a:solidFill>
+          </a:ln>
+        </p:spPr>
+        <p:style>
+          <a:lnRef idx="2">
+            <a:schemeClr val="accent1">
+              <a:shade val="50000"/>
+            </a:schemeClr>
+          </a:lnRef>
+          <a:fillRef idx="1">
+            <a:schemeClr val="accent1"/>
+          </a:fillRef>
+          <a:effectRef idx="0">
+            <a:schemeClr val="accent1"/>
+          </a:effectRef>
+          <a:fontRef idx="minor">
+            <a:schemeClr val="lt1"/>
+          </a:fontRef>
+        </p:style>
+        <p:txBody>
+          <a:bodyPr rtlCol="0" anchor="ctr"/>
+          <a:lstStyle/>
+          <a:p>
+            <a:pPr algn="ctr"/>
+            <a:r>
+              <a:rPr lang="de-CH" sz="4400" dirty="0"/>
+              <a:t>4</a:t>
+            </a:r>
+            <a:endParaRPr lang="de-CH" sz="4400" dirty="0"/>
+          </a:p>
+        </p:txBody>
+      </p:sp>
+      <p:sp>
+        <p:nvSpPr>
+          <p:cNvPr id="4" name="Gleichschenkliges Dreieck 3"/>
+          <p:cNvSpPr/>
+          <p:nvPr/>
+        </p:nvSpPr>
+        <p:spPr>
+          <a:xfrm rot="5400000">
+            <a:off x="3998564" y="2686618"/>
+            <a:ext cx="443973" cy="179490"/>
+          </a:xfrm>
+          <a:prstGeom prst="triangle">
+            <a:avLst>
+              <a:gd name="adj" fmla="val 0"/>
+            </a:avLst>
+          </a:prstGeom>
+          <a:solidFill>
+            <a:srgbClr val="FDC527"/>
+          </a:solidFill>
+          <a:ln w="38100">
+            <a:solidFill>
+              <a:schemeClr val="accent4">
+                <a:lumMod val="50000"/>
+              </a:schemeClr>
+            </a:solidFill>
+          </a:ln>
+        </p:spPr>
+        <p:style>
+          <a:lnRef idx="2">
+            <a:schemeClr val="accent1">
+              <a:shade val="50000"/>
+            </a:schemeClr>
+          </a:lnRef>
+          <a:fillRef idx="1">
+            <a:schemeClr val="accent1"/>
+          </a:fillRef>
+          <a:effectRef idx="0">
+            <a:schemeClr val="accent1"/>
+          </a:effectRef>
+          <a:fontRef idx="minor">
+            <a:schemeClr val="lt1"/>
+          </a:fontRef>
+        </p:style>
+        <p:txBody>
+          <a:bodyPr rtlCol="0" anchor="ctr"/>
+          <a:lstStyle/>
+          <a:p>
+            <a:pPr algn="ctr"/>
+            <a:endParaRPr lang="de-CH" sz="4400"/>
+          </a:p>
+        </p:txBody>
+      </p:sp>
+      <p:sp>
+        <p:nvSpPr>
+          <p:cNvPr id="5" name="Gleichschenkliges Dreieck 4"/>
+          <p:cNvSpPr/>
+          <p:nvPr/>
+        </p:nvSpPr>
+        <p:spPr>
+          <a:xfrm rot="5400000" flipV="1">
+            <a:off x="1831509" y="2681786"/>
+            <a:ext cx="443973" cy="189155"/>
+          </a:xfrm>
+          <a:prstGeom prst="triangle">
+            <a:avLst>
+              <a:gd name="adj" fmla="val 0"/>
+            </a:avLst>
+          </a:prstGeom>
+          <a:solidFill>
+            <a:srgbClr val="FDC527"/>
+          </a:solidFill>
+          <a:ln w="38100">
+            <a:solidFill>
+              <a:schemeClr val="accent4">
+                <a:lumMod val="50000"/>
+              </a:schemeClr>
+            </a:solidFill>
+          </a:ln>
+        </p:spPr>
+        <p:style>
+          <a:lnRef idx="2">
+            <a:schemeClr val="accent1">
+              <a:shade val="50000"/>
+            </a:schemeClr>
+          </a:lnRef>
+          <a:fillRef idx="1">
+            <a:schemeClr val="accent1"/>
+          </a:fillRef>
+          <a:effectRef idx="0">
+            <a:schemeClr val="accent1"/>
+          </a:effectRef>
+          <a:fontRef idx="minor">
+            <a:schemeClr val="lt1"/>
+          </a:fontRef>
+        </p:style>
+        <p:txBody>
+          <a:bodyPr rtlCol="0" anchor="ctr"/>
+          <a:lstStyle/>
+          <a:p>
+            <a:pPr algn="ctr"/>
+            <a:endParaRPr lang="de-CH" sz="4400"/>
+          </a:p>
+        </p:txBody>
+      </p:sp>
+      <p:sp>
+        <p:nvSpPr>
+          <p:cNvPr id="21" name="Rechteck 20"/>
+          <p:cNvSpPr/>
+          <p:nvPr/>
+        </p:nvSpPr>
+        <p:spPr>
+          <a:xfrm>
+            <a:off x="5887137" y="1710980"/>
+            <a:ext cx="3731759" cy="345056"/>
+          </a:xfrm>
+          <a:prstGeom prst="rect">
+            <a:avLst/>
+          </a:prstGeom>
+          <a:solidFill>
+            <a:srgbClr val="FDC527"/>
+          </a:solidFill>
+          <a:ln w="38100">
+            <a:solidFill>
+              <a:schemeClr val="accent4">
+                <a:lumMod val="50000"/>
+              </a:schemeClr>
+            </a:solidFill>
+          </a:ln>
+        </p:spPr>
+        <p:style>
+          <a:lnRef idx="2">
+            <a:schemeClr val="accent1">
+              <a:shade val="50000"/>
+            </a:schemeClr>
+          </a:lnRef>
+          <a:fillRef idx="1">
+            <a:schemeClr val="accent1"/>
+          </a:fillRef>
+          <a:effectRef idx="0">
+            <a:schemeClr val="accent1"/>
+          </a:effectRef>
+          <a:fontRef idx="minor">
+            <a:schemeClr val="lt1"/>
+          </a:fontRef>
+        </p:style>
+        <p:txBody>
+          <a:bodyPr rtlCol="0" anchor="ctr"/>
+          <a:lstStyle/>
+          <a:p>
+            <a:pPr algn="ctr"/>
+            <a:endParaRPr lang="de-CH" sz="4400"/>
+          </a:p>
+        </p:txBody>
+      </p:sp>
+      <p:sp>
+        <p:nvSpPr>
+          <p:cNvPr id="22" name="Rechteck 21"/>
+          <p:cNvSpPr/>
+          <p:nvPr/>
+        </p:nvSpPr>
+        <p:spPr>
+          <a:xfrm>
+            <a:off x="6791520" y="2056035"/>
+            <a:ext cx="1910790" cy="975360"/>
+          </a:xfrm>
+          <a:prstGeom prst="rect">
+            <a:avLst/>
+          </a:prstGeom>
+          <a:solidFill>
+            <a:srgbClr val="C00000"/>
+          </a:solidFill>
+          <a:ln w="38100">
+            <a:solidFill>
+              <a:srgbClr val="800000"/>
+            </a:solidFill>
+          </a:ln>
+        </p:spPr>
+        <p:style>
+          <a:lnRef idx="2">
+            <a:schemeClr val="accent1">
+              <a:shade val="50000"/>
+            </a:schemeClr>
+          </a:lnRef>
+          <a:fillRef idx="1">
+            <a:schemeClr val="accent1"/>
+          </a:fillRef>
+          <a:effectRef idx="0">
+            <a:schemeClr val="accent1"/>
+          </a:effectRef>
+          <a:fontRef idx="minor">
+            <a:schemeClr val="lt1"/>
+          </a:fontRef>
+        </p:style>
+        <p:txBody>
+          <a:bodyPr rtlCol="0" anchor="ctr"/>
+          <a:lstStyle/>
+          <a:p>
+            <a:pPr algn="ctr"/>
+            <a:r>
+              <a:rPr lang="de-CH" sz="4400" dirty="0"/>
+              <a:t>4</a:t>
+            </a:r>
+            <a:endParaRPr lang="de-CH" sz="4400" dirty="0"/>
+          </a:p>
+        </p:txBody>
+      </p:sp>
+      <p:sp>
+        <p:nvSpPr>
+          <p:cNvPr id="23" name="Gleichschenkliges Dreieck 22"/>
+          <p:cNvSpPr/>
+          <p:nvPr/>
+        </p:nvSpPr>
+        <p:spPr>
+          <a:xfrm rot="5400000">
+            <a:off x="8606040" y="2188277"/>
+            <a:ext cx="443973" cy="179490"/>
+          </a:xfrm>
+          <a:prstGeom prst="triangle">
+            <a:avLst>
+              <a:gd name="adj" fmla="val 0"/>
+            </a:avLst>
+          </a:prstGeom>
+          <a:solidFill>
+            <a:srgbClr val="FDC527"/>
+          </a:solidFill>
+          <a:ln w="38100">
+            <a:solidFill>
+              <a:schemeClr val="accent4">
+                <a:lumMod val="50000"/>
+              </a:schemeClr>
+            </a:solidFill>
+          </a:ln>
+        </p:spPr>
+        <p:style>
+          <a:lnRef idx="2">
+            <a:schemeClr val="accent1">
+              <a:shade val="50000"/>
+            </a:schemeClr>
+          </a:lnRef>
+          <a:fillRef idx="1">
+            <a:schemeClr val="accent1"/>
+          </a:fillRef>
+          <a:effectRef idx="0">
+            <a:schemeClr val="accent1"/>
+          </a:effectRef>
+          <a:fontRef idx="minor">
+            <a:schemeClr val="lt1"/>
+          </a:fontRef>
+        </p:style>
+        <p:txBody>
+          <a:bodyPr rtlCol="0" anchor="ctr"/>
+          <a:lstStyle/>
+          <a:p>
+            <a:pPr algn="ctr"/>
+            <a:endParaRPr lang="de-CH" sz="4400"/>
+          </a:p>
+        </p:txBody>
+      </p:sp>
+      <p:sp>
+        <p:nvSpPr>
+          <p:cNvPr id="24" name="Gleichschenkliges Dreieck 23"/>
+          <p:cNvSpPr/>
+          <p:nvPr/>
+        </p:nvSpPr>
+        <p:spPr>
+          <a:xfrm rot="5400000" flipV="1">
+            <a:off x="6438985" y="2183445"/>
+            <a:ext cx="443973" cy="189155"/>
+          </a:xfrm>
+          <a:prstGeom prst="triangle">
+            <a:avLst>
+              <a:gd name="adj" fmla="val 0"/>
+            </a:avLst>
+          </a:prstGeom>
+          <a:solidFill>
+            <a:srgbClr val="FDC527"/>
+          </a:solidFill>
+          <a:ln w="38100">
+            <a:solidFill>
+              <a:schemeClr val="accent4">
+                <a:lumMod val="50000"/>
+              </a:schemeClr>
+            </a:solidFill>
+          </a:ln>
+        </p:spPr>
+        <p:style>
+          <a:lnRef idx="2">
+            <a:schemeClr val="accent1">
+              <a:shade val="50000"/>
+            </a:schemeClr>
+          </a:lnRef>
+          <a:fillRef idx="1">
+            <a:schemeClr val="accent1"/>
+          </a:fillRef>
+          <a:effectRef idx="0">
+            <a:schemeClr val="accent1"/>
+          </a:effectRef>
+          <a:fontRef idx="minor">
+            <a:schemeClr val="lt1"/>
+          </a:fontRef>
+        </p:style>
+        <p:txBody>
+          <a:bodyPr rtlCol="0" anchor="ctr"/>
+          <a:lstStyle/>
+          <a:p>
+            <a:pPr algn="ctr"/>
+            <a:endParaRPr lang="de-CH" sz="4400"/>
+          </a:p>
+        </p:txBody>
+      </p:sp>
+      <p:sp>
+        <p:nvSpPr>
+          <p:cNvPr id="25" name="Trapezoid 24"/>
+          <p:cNvSpPr/>
+          <p:nvPr/>
+        </p:nvSpPr>
+        <p:spPr>
+          <a:xfrm>
+            <a:off x="7513235" y="1111539"/>
+            <a:ext cx="467360" cy="599440"/>
+          </a:xfrm>
+          <a:prstGeom prst="trapezoid">
+            <a:avLst/>
+          </a:prstGeom>
+          <a:solidFill>
+            <a:srgbClr val="FDC527"/>
+          </a:solidFill>
+          <a:ln w="38100">
+            <a:solidFill>
+              <a:schemeClr val="accent4">
+                <a:lumMod val="50000"/>
+              </a:schemeClr>
+            </a:solidFill>
+          </a:ln>
+        </p:spPr>
+        <p:style>
+          <a:lnRef idx="2">
+            <a:schemeClr val="accent1">
+              <a:shade val="50000"/>
+            </a:schemeClr>
+          </a:lnRef>
+          <a:fillRef idx="1">
+            <a:schemeClr val="accent1"/>
+          </a:fillRef>
+          <a:effectRef idx="0">
+            <a:schemeClr val="accent1"/>
+          </a:effectRef>
+          <a:fontRef idx="minor">
+            <a:schemeClr val="lt1"/>
+          </a:fontRef>
+        </p:style>
+        <p:txBody>
+          <a:bodyPr rtlCol="0" anchor="ctr"/>
+          <a:lstStyle/>
+          <a:p>
+            <a:pPr algn="ctr"/>
+            <a:endParaRPr lang="de-CH" sz="4400"/>
+          </a:p>
+        </p:txBody>
+      </p:sp>
+      <p:sp>
+        <p:nvSpPr>
+          <p:cNvPr id="26" name="Trapezoid 25"/>
+          <p:cNvSpPr/>
+          <p:nvPr/>
+        </p:nvSpPr>
+        <p:spPr>
+          <a:xfrm flipV="1">
+            <a:off x="7391313" y="584582"/>
+            <a:ext cx="706205" cy="254000"/>
+          </a:xfrm>
+          <a:prstGeom prst="trapezoid">
+            <a:avLst/>
+          </a:prstGeom>
+          <a:solidFill>
+            <a:srgbClr val="FDC527"/>
+          </a:solidFill>
+          <a:ln w="38100">
+            <a:solidFill>
+              <a:schemeClr val="accent4">
+                <a:lumMod val="50000"/>
+              </a:schemeClr>
+            </a:solidFill>
+          </a:ln>
+        </p:spPr>
+        <p:style>
+          <a:lnRef idx="2">
+            <a:schemeClr val="accent1">
+              <a:shade val="50000"/>
+            </a:schemeClr>
+          </a:lnRef>
+          <a:fillRef idx="1">
+            <a:schemeClr val="accent1"/>
+          </a:fillRef>
+          <a:effectRef idx="0">
+            <a:schemeClr val="accent1"/>
+          </a:effectRef>
+          <a:fontRef idx="minor">
+            <a:schemeClr val="lt1"/>
+          </a:fontRef>
+        </p:style>
+        <p:txBody>
+          <a:bodyPr rtlCol="0" anchor="ctr"/>
+          <a:lstStyle/>
+          <a:p>
+            <a:pPr algn="ctr"/>
+            <a:endParaRPr lang="de-CH" sz="4400"/>
+          </a:p>
+        </p:txBody>
+      </p:sp>
+      <p:cxnSp>
+        <p:nvCxnSpPr>
+          <p:cNvPr id="33" name="Gerader Verbinder 32"/>
+          <p:cNvCxnSpPr>
+            <a:stCxn id="26" idx="2"/>
+          </p:cNvCxnSpPr>
+          <p:nvPr/>
+        </p:nvCxnSpPr>
+        <p:spPr>
+          <a:xfrm flipV="1">
+            <a:off x="7744416" y="-203200"/>
+            <a:ext cx="8600" cy="787782"/>
+          </a:xfrm>
+          <a:prstGeom prst="line">
+            <a:avLst/>
+          </a:prstGeom>
+          <a:ln w="76200">
+            <a:solidFill>
+              <a:schemeClr val="bg2">
+                <a:lumMod val="25000"/>
+              </a:schemeClr>
+            </a:solidFill>
+          </a:ln>
+        </p:spPr>
+        <p:style>
+          <a:lnRef idx="1">
+            <a:schemeClr val="accent1"/>
+          </a:lnRef>
+          <a:fillRef idx="0">
+            <a:schemeClr val="accent1"/>
+          </a:fillRef>
+          <a:effectRef idx="0">
+            <a:schemeClr val="accent1"/>
+          </a:effectRef>
+          <a:fontRef idx="minor">
+            <a:schemeClr val="tx1"/>
+          </a:fontRef>
+        </p:style>
+      </p:cxnSp>
+      <p:sp>
+        <p:nvSpPr>
+          <p:cNvPr id="38" name="Rechteck 37"/>
+          <p:cNvSpPr/>
+          <p:nvPr/>
+        </p:nvSpPr>
+        <p:spPr>
+          <a:xfrm>
+            <a:off x="8460241" y="5104420"/>
+            <a:ext cx="3731759" cy="345056"/>
+          </a:xfrm>
+          <a:prstGeom prst="rect">
+            <a:avLst/>
+          </a:prstGeom>
+          <a:solidFill>
+            <a:srgbClr val="FDC527"/>
+          </a:solidFill>
+          <a:ln w="38100">
+            <a:solidFill>
+              <a:schemeClr val="accent4">
+                <a:lumMod val="50000"/>
+              </a:schemeClr>
+            </a:solidFill>
+          </a:ln>
+        </p:spPr>
+        <p:style>
+          <a:lnRef idx="2">
+            <a:schemeClr val="accent1">
+              <a:shade val="50000"/>
+            </a:schemeClr>
+          </a:lnRef>
+          <a:fillRef idx="1">
+            <a:schemeClr val="accent1"/>
+          </a:fillRef>
+          <a:effectRef idx="0">
+            <a:schemeClr val="accent1"/>
+          </a:effectRef>
+          <a:fontRef idx="minor">
+            <a:schemeClr val="lt1"/>
+          </a:fontRef>
+        </p:style>
+        <p:txBody>
+          <a:bodyPr rtlCol="0" anchor="ctr"/>
+          <a:lstStyle/>
+          <a:p>
+            <a:pPr algn="ctr"/>
+            <a:endParaRPr lang="de-CH" sz="4400"/>
+          </a:p>
+        </p:txBody>
+      </p:sp>
+      <p:sp>
+        <p:nvSpPr>
+          <p:cNvPr id="39" name="Rechteck 38"/>
+          <p:cNvSpPr/>
+          <p:nvPr/>
+        </p:nvSpPr>
+        <p:spPr>
+          <a:xfrm>
+            <a:off x="9364624" y="5449475"/>
+            <a:ext cx="1910790" cy="975360"/>
+          </a:xfrm>
+          <a:prstGeom prst="rect">
+            <a:avLst/>
+          </a:prstGeom>
+          <a:solidFill>
+            <a:srgbClr val="C00000"/>
+          </a:solidFill>
+          <a:ln w="38100">
+            <a:solidFill>
+              <a:srgbClr val="800000"/>
+            </a:solidFill>
+          </a:ln>
+        </p:spPr>
+        <p:style>
+          <a:lnRef idx="2">
+            <a:schemeClr val="accent1">
+              <a:shade val="50000"/>
+            </a:schemeClr>
+          </a:lnRef>
+          <a:fillRef idx="1">
+            <a:schemeClr val="accent1"/>
+          </a:fillRef>
+          <a:effectRef idx="0">
+            <a:schemeClr val="accent1"/>
+          </a:effectRef>
+          <a:fontRef idx="minor">
+            <a:schemeClr val="lt1"/>
+          </a:fontRef>
+        </p:style>
+        <p:txBody>
+          <a:bodyPr rtlCol="0" anchor="ctr"/>
+          <a:lstStyle/>
+          <a:p>
+            <a:pPr algn="ctr"/>
+            <a:r>
+              <a:rPr lang="de-CH" sz="4400" dirty="0"/>
+              <a:t>4</a:t>
+            </a:r>
+            <a:endParaRPr lang="de-CH" sz="4400" dirty="0"/>
+          </a:p>
+        </p:txBody>
+      </p:sp>
+      <p:sp>
+        <p:nvSpPr>
+          <p:cNvPr id="40" name="Gleichschenkliges Dreieck 39"/>
+          <p:cNvSpPr/>
+          <p:nvPr/>
+        </p:nvSpPr>
+        <p:spPr>
+          <a:xfrm rot="5400000">
+            <a:off x="11179144" y="5581717"/>
+            <a:ext cx="443973" cy="179490"/>
+          </a:xfrm>
+          <a:prstGeom prst="triangle">
+            <a:avLst>
+              <a:gd name="adj" fmla="val 0"/>
+            </a:avLst>
+          </a:prstGeom>
+          <a:solidFill>
+            <a:srgbClr val="FDC527"/>
+          </a:solidFill>
+          <a:ln w="38100">
+            <a:solidFill>
+              <a:schemeClr val="accent4">
+                <a:lumMod val="50000"/>
+              </a:schemeClr>
+            </a:solidFill>
+          </a:ln>
+        </p:spPr>
+        <p:style>
+          <a:lnRef idx="2">
+            <a:schemeClr val="accent1">
+              <a:shade val="50000"/>
+            </a:schemeClr>
+          </a:lnRef>
+          <a:fillRef idx="1">
+            <a:schemeClr val="accent1"/>
+          </a:fillRef>
+          <a:effectRef idx="0">
+            <a:schemeClr val="accent1"/>
+          </a:effectRef>
+          <a:fontRef idx="minor">
+            <a:schemeClr val="lt1"/>
+          </a:fontRef>
+        </p:style>
+        <p:txBody>
+          <a:bodyPr rtlCol="0" anchor="ctr"/>
+          <a:lstStyle/>
+          <a:p>
+            <a:pPr algn="ctr"/>
+            <a:endParaRPr lang="de-CH" sz="4400"/>
+          </a:p>
+        </p:txBody>
+      </p:sp>
+      <p:sp>
+        <p:nvSpPr>
+          <p:cNvPr id="41" name="Gleichschenkliges Dreieck 40"/>
+          <p:cNvSpPr/>
+          <p:nvPr/>
+        </p:nvSpPr>
+        <p:spPr>
+          <a:xfrm rot="5400000" flipV="1">
+            <a:off x="9012089" y="5576885"/>
+            <a:ext cx="443973" cy="189155"/>
+          </a:xfrm>
+          <a:prstGeom prst="triangle">
+            <a:avLst>
+              <a:gd name="adj" fmla="val 0"/>
+            </a:avLst>
+          </a:prstGeom>
+          <a:solidFill>
+            <a:srgbClr val="FDC527"/>
+          </a:solidFill>
+          <a:ln w="38100">
+            <a:solidFill>
+              <a:schemeClr val="accent4">
+                <a:lumMod val="50000"/>
+              </a:schemeClr>
+            </a:solidFill>
+          </a:ln>
+        </p:spPr>
+        <p:style>
+          <a:lnRef idx="2">
+            <a:schemeClr val="accent1">
+              <a:shade val="50000"/>
+            </a:schemeClr>
+          </a:lnRef>
+          <a:fillRef idx="1">
+            <a:schemeClr val="accent1"/>
+          </a:fillRef>
+          <a:effectRef idx="0">
+            <a:schemeClr val="accent1"/>
+          </a:effectRef>
+          <a:fontRef idx="minor">
+            <a:schemeClr val="lt1"/>
+          </a:fontRef>
+        </p:style>
+        <p:txBody>
+          <a:bodyPr rtlCol="0" anchor="ctr"/>
+          <a:lstStyle/>
+          <a:p>
+            <a:pPr algn="ctr"/>
+            <a:endParaRPr lang="de-CH" sz="4400"/>
+          </a:p>
+        </p:txBody>
+      </p:sp>
+    </p:spTree>
+    <p:extLst>
+      <p:ext uri="{BB962C8B-B14F-4D97-AF65-F5344CB8AC3E}">
+        <p14:creationId xmlns:p14="http://schemas.microsoft.com/office/powerpoint/2010/main" val="2843352897"/>
       </p:ext>
     </p:extLst>
   </p:cSld>

</xml_diff>

<commit_message>
Finale Version der Projektskizze erstellt.
</commit_message>
<xml_diff>
--- a/Documents/Projektskizze/docker_mock_up.pptx
+++ b/Documents/Projektskizze/docker_mock_up.pptx
@@ -244,7 +244,7 @@
           <a:p>
             <a:fld id="{240477B1-2D1B-4A37-88DE-78BFA2AD584C}" type="datetimeFigureOut">
               <a:rPr lang="de-CH" smtClean="0"/>
-              <a:t>27.09.2014</a:t>
+              <a:t>29.09.2014</a:t>
             </a:fld>
             <a:endParaRPr lang="de-CH"/>
           </a:p>
@@ -414,7 +414,7 @@
           <a:p>
             <a:fld id="{240477B1-2D1B-4A37-88DE-78BFA2AD584C}" type="datetimeFigureOut">
               <a:rPr lang="de-CH" smtClean="0"/>
-              <a:t>27.09.2014</a:t>
+              <a:t>29.09.2014</a:t>
             </a:fld>
             <a:endParaRPr lang="de-CH"/>
           </a:p>
@@ -594,7 +594,7 @@
           <a:p>
             <a:fld id="{240477B1-2D1B-4A37-88DE-78BFA2AD584C}" type="datetimeFigureOut">
               <a:rPr lang="de-CH" smtClean="0"/>
-              <a:t>27.09.2014</a:t>
+              <a:t>29.09.2014</a:t>
             </a:fld>
             <a:endParaRPr lang="de-CH"/>
           </a:p>
@@ -764,7 +764,7 @@
           <a:p>
             <a:fld id="{240477B1-2D1B-4A37-88DE-78BFA2AD584C}" type="datetimeFigureOut">
               <a:rPr lang="de-CH" smtClean="0"/>
-              <a:t>27.09.2014</a:t>
+              <a:t>29.09.2014</a:t>
             </a:fld>
             <a:endParaRPr lang="de-CH"/>
           </a:p>
@@ -1010,7 +1010,7 @@
           <a:p>
             <a:fld id="{240477B1-2D1B-4A37-88DE-78BFA2AD584C}" type="datetimeFigureOut">
               <a:rPr lang="de-CH" smtClean="0"/>
-              <a:t>27.09.2014</a:t>
+              <a:t>29.09.2014</a:t>
             </a:fld>
             <a:endParaRPr lang="de-CH"/>
           </a:p>
@@ -1242,7 +1242,7 @@
           <a:p>
             <a:fld id="{240477B1-2D1B-4A37-88DE-78BFA2AD584C}" type="datetimeFigureOut">
               <a:rPr lang="de-CH" smtClean="0"/>
-              <a:t>27.09.2014</a:t>
+              <a:t>29.09.2014</a:t>
             </a:fld>
             <a:endParaRPr lang="de-CH"/>
           </a:p>
@@ -1609,7 +1609,7 @@
           <a:p>
             <a:fld id="{240477B1-2D1B-4A37-88DE-78BFA2AD584C}" type="datetimeFigureOut">
               <a:rPr lang="de-CH" smtClean="0"/>
-              <a:t>27.09.2014</a:t>
+              <a:t>29.09.2014</a:t>
             </a:fld>
             <a:endParaRPr lang="de-CH"/>
           </a:p>
@@ -1727,7 +1727,7 @@
           <a:p>
             <a:fld id="{240477B1-2D1B-4A37-88DE-78BFA2AD584C}" type="datetimeFigureOut">
               <a:rPr lang="de-CH" smtClean="0"/>
-              <a:t>27.09.2014</a:t>
+              <a:t>29.09.2014</a:t>
             </a:fld>
             <a:endParaRPr lang="de-CH"/>
           </a:p>
@@ -1822,7 +1822,7 @@
           <a:p>
             <a:fld id="{240477B1-2D1B-4A37-88DE-78BFA2AD584C}" type="datetimeFigureOut">
               <a:rPr lang="de-CH" smtClean="0"/>
-              <a:t>27.09.2014</a:t>
+              <a:t>29.09.2014</a:t>
             </a:fld>
             <a:endParaRPr lang="de-CH"/>
           </a:p>
@@ -2099,7 +2099,7 @@
           <a:p>
             <a:fld id="{240477B1-2D1B-4A37-88DE-78BFA2AD584C}" type="datetimeFigureOut">
               <a:rPr lang="de-CH" smtClean="0"/>
-              <a:t>27.09.2014</a:t>
+              <a:t>29.09.2014</a:t>
             </a:fld>
             <a:endParaRPr lang="de-CH"/>
           </a:p>
@@ -2352,7 +2352,7 @@
           <a:p>
             <a:fld id="{240477B1-2D1B-4A37-88DE-78BFA2AD584C}" type="datetimeFigureOut">
               <a:rPr lang="de-CH" smtClean="0"/>
-              <a:t>27.09.2014</a:t>
+              <a:t>29.09.2014</a:t>
             </a:fld>
             <a:endParaRPr lang="de-CH"/>
           </a:p>
@@ -2565,7 +2565,7 @@
           <a:p>
             <a:fld id="{240477B1-2D1B-4A37-88DE-78BFA2AD584C}" type="datetimeFigureOut">
               <a:rPr lang="de-CH" smtClean="0"/>
-              <a:t>27.09.2014</a:t>
+              <a:t>29.09.2014</a:t>
             </a:fld>
             <a:endParaRPr lang="de-CH"/>
           </a:p>
@@ -2981,6 +2981,56 @@
           <a:chExt cx="0" cy="0"/>
         </a:xfrm>
       </p:grpSpPr>
+      <p:sp>
+        <p:nvSpPr>
+          <p:cNvPr id="90" name="Wolke 89"/>
+          <p:cNvSpPr/>
+          <p:nvPr/>
+        </p:nvSpPr>
+        <p:spPr>
+          <a:xfrm>
+            <a:off x="-253621" y="2212928"/>
+            <a:ext cx="7496648" cy="4694993"/>
+          </a:xfrm>
+          <a:prstGeom prst="cloud">
+            <a:avLst/>
+          </a:prstGeom>
+          <a:solidFill>
+            <a:schemeClr val="bg1"/>
+          </a:solidFill>
+          <a:ln>
+            <a:noFill/>
+          </a:ln>
+        </p:spPr>
+        <p:style>
+          <a:lnRef idx="2">
+            <a:schemeClr val="accent1">
+              <a:shade val="50000"/>
+            </a:schemeClr>
+          </a:lnRef>
+          <a:fillRef idx="1">
+            <a:schemeClr val="accent1"/>
+          </a:fillRef>
+          <a:effectRef idx="0">
+            <a:schemeClr val="accent1"/>
+          </a:effectRef>
+          <a:fontRef idx="minor">
+            <a:schemeClr val="lt1"/>
+          </a:fontRef>
+        </p:style>
+        <p:txBody>
+          <a:bodyPr rtlCol="0" anchor="ctr"/>
+          <a:lstStyle/>
+          <a:p>
+            <a:pPr algn="ctr"/>
+            <a:r>
+              <a:rPr lang="de-CH" dirty="0" err="1" smtClean="0"/>
+              <a:t>zzzzzz</a:t>
+            </a:r>
+            <a:endParaRPr lang="de-CH" dirty="0"/>
+          </a:p>
+        </p:txBody>
+      </p:sp>
       <p:grpSp>
         <p:nvGrpSpPr>
           <p:cNvPr id="21" name="Gruppieren 20"/>
@@ -2989,7 +3039,7 @@
         </p:nvGrpSpPr>
         <p:grpSpPr>
           <a:xfrm>
-            <a:off x="6200693" y="915584"/>
+            <a:off x="4685163" y="938534"/>
             <a:ext cx="3731759" cy="2441014"/>
             <a:chOff x="2688443" y="801642"/>
             <a:chExt cx="3731759" cy="2441014"/>
@@ -3436,7 +3486,6 @@
                 <a:rPr lang="de-CH" sz="4400" dirty="0"/>
                 <a:t>4</a:t>
               </a:r>
-              <a:endParaRPr lang="de-CH" sz="4400" dirty="0"/>
             </a:p>
           </p:txBody>
         </p:sp>
@@ -3588,56 +3637,6 @@
           <a:p>
             <a:pPr algn="ctr"/>
             <a:endParaRPr lang="de-CH"/>
-          </a:p>
-        </p:txBody>
-      </p:sp>
-      <p:sp>
-        <p:nvSpPr>
-          <p:cNvPr id="90" name="Wolke 89"/>
-          <p:cNvSpPr/>
-          <p:nvPr/>
-        </p:nvSpPr>
-        <p:spPr>
-          <a:xfrm>
-            <a:off x="-253621" y="2212928"/>
-            <a:ext cx="7496648" cy="4694993"/>
-          </a:xfrm>
-          <a:prstGeom prst="cloud">
-            <a:avLst/>
-          </a:prstGeom>
-          <a:solidFill>
-            <a:schemeClr val="bg1"/>
-          </a:solidFill>
-          <a:ln>
-            <a:noFill/>
-          </a:ln>
-        </p:spPr>
-        <p:style>
-          <a:lnRef idx="2">
-            <a:schemeClr val="accent1">
-              <a:shade val="50000"/>
-            </a:schemeClr>
-          </a:lnRef>
-          <a:fillRef idx="1">
-            <a:schemeClr val="accent1"/>
-          </a:fillRef>
-          <a:effectRef idx="0">
-            <a:schemeClr val="accent1"/>
-          </a:effectRef>
-          <a:fontRef idx="minor">
-            <a:schemeClr val="lt1"/>
-          </a:fontRef>
-        </p:style>
-        <p:txBody>
-          <a:bodyPr rtlCol="0" anchor="ctr"/>
-          <a:lstStyle/>
-          <a:p>
-            <a:pPr algn="ctr"/>
-            <a:r>
-              <a:rPr lang="de-CH" dirty="0" err="1" smtClean="0"/>
-              <a:t>zzzzzz</a:t>
-            </a:r>
-            <a:endParaRPr lang="de-CH" dirty="0"/>
           </a:p>
         </p:txBody>
       </p:sp>
@@ -4300,7 +4299,7 @@
         </p:nvSpPr>
         <p:spPr>
           <a:xfrm>
-            <a:off x="756423" y="4042087"/>
+            <a:off x="756423" y="4169412"/>
             <a:ext cx="102242" cy="1056818"/>
           </a:xfrm>
           <a:prstGeom prst="rect">
@@ -4352,7 +4351,7 @@
         </p:nvSpPr>
         <p:spPr>
           <a:xfrm>
-            <a:off x="467730" y="4844262"/>
+            <a:off x="467730" y="4971587"/>
             <a:ext cx="288694" cy="148348"/>
           </a:xfrm>
           <a:prstGeom prst="rect">
@@ -4404,7 +4403,7 @@
         </p:nvSpPr>
         <p:spPr>
           <a:xfrm>
-            <a:off x="9785110" y="3455300"/>
+            <a:off x="9785110" y="3582625"/>
             <a:ext cx="1215118" cy="1537311"/>
           </a:xfrm>
           <a:prstGeom prst="rect">
@@ -4456,7 +4455,7 @@
         </p:nvSpPr>
         <p:spPr>
           <a:xfrm>
-            <a:off x="10331385" y="3201220"/>
+            <a:off x="10331385" y="3328545"/>
             <a:ext cx="600759" cy="236401"/>
           </a:xfrm>
           <a:prstGeom prst="rect">
@@ -4503,54 +4502,13 @@
       </p:sp>
       <p:sp>
         <p:nvSpPr>
-          <p:cNvPr id="4" name="Rechteck 3"/>
-          <p:cNvSpPr/>
-          <p:nvPr/>
-        </p:nvSpPr>
-        <p:spPr>
-          <a:xfrm>
-            <a:off x="0" y="6198501"/>
-            <a:ext cx="12192000" cy="659500"/>
-          </a:xfrm>
-          <a:prstGeom prst="rect">
-            <a:avLst/>
-          </a:prstGeom>
-          <a:ln w="38100"/>
-        </p:spPr>
-        <p:style>
-          <a:lnRef idx="2">
-            <a:schemeClr val="accent1">
-              <a:shade val="50000"/>
-            </a:schemeClr>
-          </a:lnRef>
-          <a:fillRef idx="1">
-            <a:schemeClr val="accent1"/>
-          </a:fillRef>
-          <a:effectRef idx="0">
-            <a:schemeClr val="accent1"/>
-          </a:effectRef>
-          <a:fontRef idx="minor">
-            <a:schemeClr val="lt1"/>
-          </a:fontRef>
-        </p:style>
-        <p:txBody>
-          <a:bodyPr rtlCol="0" anchor="ctr"/>
-          <a:lstStyle/>
-          <a:p>
-            <a:pPr algn="ctr"/>
-            <a:endParaRPr lang="de-CH"/>
-          </a:p>
-        </p:txBody>
-      </p:sp>
-      <p:sp>
-        <p:nvSpPr>
           <p:cNvPr id="5" name="Trapezoid 4"/>
           <p:cNvSpPr/>
           <p:nvPr/>
         </p:nvSpPr>
         <p:spPr>
           <a:xfrm rot="10800000">
-            <a:off x="379785" y="4999619"/>
+            <a:off x="379785" y="5126944"/>
             <a:ext cx="10866049" cy="599440"/>
           </a:xfrm>
           <a:prstGeom prst="trapezoid">
@@ -4601,7 +4559,7 @@
         </p:nvSpPr>
         <p:spPr>
           <a:xfrm rot="10800000">
-            <a:off x="527685" y="5599060"/>
+            <a:off x="527685" y="5726385"/>
             <a:ext cx="10568289" cy="599440"/>
           </a:xfrm>
           <a:prstGeom prst="trapezoid">
@@ -4649,7 +4607,7 @@
         </p:nvSpPr>
         <p:spPr>
           <a:xfrm>
-            <a:off x="11644131" y="4999619"/>
+            <a:off x="11644131" y="5022769"/>
             <a:ext cx="715477" cy="1190970"/>
           </a:xfrm>
           <a:prstGeom prst="rect">
@@ -4690,7 +4648,7 @@
         </p:nvSpPr>
         <p:spPr>
           <a:xfrm>
-            <a:off x="9949422" y="2965050"/>
+            <a:off x="9949422" y="3092375"/>
             <a:ext cx="381963" cy="483242"/>
           </a:xfrm>
           <a:prstGeom prst="rect">
@@ -4742,7 +4700,7 @@
         </p:nvSpPr>
         <p:spPr>
           <a:xfrm>
-            <a:off x="9785110" y="3616669"/>
+            <a:off x="9785110" y="3743994"/>
             <a:ext cx="903966" cy="138349"/>
           </a:xfrm>
           <a:prstGeom prst="rect">
@@ -4796,7 +4754,7 @@
         </p:nvSpPr>
         <p:spPr>
           <a:xfrm>
-            <a:off x="9785110" y="3916387"/>
+            <a:off x="9785110" y="4043712"/>
             <a:ext cx="486136" cy="125700"/>
           </a:xfrm>
           <a:prstGeom prst="rect">
@@ -4850,7 +4808,7 @@
         </p:nvSpPr>
         <p:spPr>
           <a:xfrm>
-            <a:off x="10774632" y="3916387"/>
+            <a:off x="10774632" y="4043712"/>
             <a:ext cx="157512" cy="137901"/>
           </a:xfrm>
           <a:prstGeom prst="rect">
@@ -4904,7 +4862,7 @@
         </p:nvSpPr>
         <p:spPr>
           <a:xfrm>
-            <a:off x="10774632" y="4308368"/>
+            <a:off x="10774632" y="4435693"/>
             <a:ext cx="157512" cy="137901"/>
           </a:xfrm>
           <a:prstGeom prst="rect">
@@ -4958,7 +4916,7 @@
         </p:nvSpPr>
         <p:spPr>
           <a:xfrm>
-            <a:off x="10395395" y="4308368"/>
+            <a:off x="10395395" y="4435693"/>
             <a:ext cx="157512" cy="137901"/>
           </a:xfrm>
           <a:prstGeom prst="rect">
@@ -5012,7 +4970,7 @@
         </p:nvSpPr>
         <p:spPr>
           <a:xfrm>
-            <a:off x="9949422" y="4331228"/>
+            <a:off x="9949422" y="4458553"/>
             <a:ext cx="157512" cy="137901"/>
           </a:xfrm>
           <a:prstGeom prst="rect">
@@ -5066,7 +5024,7 @@
         </p:nvSpPr>
         <p:spPr>
           <a:xfrm>
-            <a:off x="10638564" y="2971898"/>
+            <a:off x="10638564" y="3099223"/>
             <a:ext cx="136068" cy="204565"/>
           </a:xfrm>
           <a:prstGeom prst="rect">
@@ -5119,7 +5077,7 @@
         </p:nvSpPr>
         <p:spPr>
           <a:xfrm>
-            <a:off x="9738216" y="6040425"/>
+            <a:off x="9738216" y="6167750"/>
             <a:ext cx="278934" cy="62850"/>
           </a:xfrm>
           <a:prstGeom prst="rect">
@@ -5172,7 +5130,7 @@
         </p:nvSpPr>
         <p:spPr>
           <a:xfrm>
-            <a:off x="9738216" y="5887933"/>
+            <a:off x="9738216" y="6015258"/>
             <a:ext cx="278934" cy="62850"/>
           </a:xfrm>
           <a:prstGeom prst="rect">
@@ -5225,7 +5183,7 @@
         </p:nvSpPr>
         <p:spPr>
           <a:xfrm>
-            <a:off x="9734310" y="5253058"/>
+            <a:off x="9734310" y="5380383"/>
             <a:ext cx="278934" cy="62850"/>
           </a:xfrm>
           <a:prstGeom prst="rect">
@@ -5278,7 +5236,7 @@
         </p:nvSpPr>
         <p:spPr>
           <a:xfrm>
-            <a:off x="9734310" y="5413078"/>
+            <a:off x="9734310" y="5540403"/>
             <a:ext cx="278934" cy="62850"/>
           </a:xfrm>
           <a:prstGeom prst="rect">
@@ -5331,7 +5289,7 @@
         </p:nvSpPr>
         <p:spPr>
           <a:xfrm>
-            <a:off x="9734310" y="5571086"/>
+            <a:off x="9734310" y="5698411"/>
             <a:ext cx="278934" cy="62850"/>
           </a:xfrm>
           <a:prstGeom prst="rect">
@@ -5384,7 +5342,7 @@
         </p:nvSpPr>
         <p:spPr>
           <a:xfrm>
-            <a:off x="9738216" y="5729094"/>
+            <a:off x="9738216" y="5856419"/>
             <a:ext cx="278934" cy="62850"/>
           </a:xfrm>
           <a:prstGeom prst="rect">
@@ -5437,7 +5395,7 @@
         </p:nvSpPr>
         <p:spPr>
           <a:xfrm>
-            <a:off x="9734310" y="5100566"/>
+            <a:off x="9734310" y="5227891"/>
             <a:ext cx="278934" cy="62850"/>
           </a:xfrm>
           <a:prstGeom prst="rect">
@@ -5490,7 +5448,7 @@
         </p:nvSpPr>
         <p:spPr>
           <a:xfrm>
-            <a:off x="920736" y="3986857"/>
+            <a:off x="920736" y="4114182"/>
             <a:ext cx="975360" cy="975360"/>
           </a:xfrm>
           <a:prstGeom prst="rect">
@@ -5544,7 +5502,7 @@
         </p:nvSpPr>
         <p:spPr>
           <a:xfrm>
-            <a:off x="3870420" y="3986843"/>
+            <a:off x="3870420" y="4114168"/>
             <a:ext cx="2926080" cy="975360"/>
           </a:xfrm>
           <a:prstGeom prst="rect">
@@ -5598,7 +5556,7 @@
         </p:nvSpPr>
         <p:spPr>
           <a:xfrm>
-            <a:off x="1930223" y="3986857"/>
+            <a:off x="1930223" y="4114182"/>
             <a:ext cx="1910790" cy="975360"/>
           </a:xfrm>
           <a:prstGeom prst="rect">
@@ -5650,7 +5608,7 @@
         </p:nvSpPr>
         <p:spPr>
           <a:xfrm>
-            <a:off x="8723487" y="3997465"/>
+            <a:off x="8723487" y="4124790"/>
             <a:ext cx="975360" cy="975360"/>
           </a:xfrm>
           <a:prstGeom prst="rect">
@@ -5702,7 +5660,7 @@
         </p:nvSpPr>
         <p:spPr>
           <a:xfrm>
-            <a:off x="920736" y="2988986"/>
+            <a:off x="920736" y="3116311"/>
             <a:ext cx="1910790" cy="975360"/>
           </a:xfrm>
           <a:prstGeom prst="rect">
@@ -7953,7 +7911,7 @@
         </p:nvSpPr>
         <p:spPr>
           <a:xfrm>
-            <a:off x="3877534" y="2971801"/>
+            <a:off x="3877534" y="3099126"/>
             <a:ext cx="1910790" cy="975360"/>
           </a:xfrm>
           <a:prstGeom prst="rect">
@@ -8136,6 +8094,47 @@
           <a:p>
             <a:pPr algn="ctr"/>
             <a:endParaRPr lang="de-CH" sz="4400" dirty="0"/>
+          </a:p>
+        </p:txBody>
+      </p:sp>
+      <p:sp>
+        <p:nvSpPr>
+          <p:cNvPr id="4" name="Rechteck 3"/>
+          <p:cNvSpPr/>
+          <p:nvPr/>
+        </p:nvSpPr>
+        <p:spPr>
+          <a:xfrm>
+            <a:off x="0" y="6221651"/>
+            <a:ext cx="12192000" cy="659500"/>
+          </a:xfrm>
+          <a:prstGeom prst="rect">
+            <a:avLst/>
+          </a:prstGeom>
+          <a:ln w="38100"/>
+        </p:spPr>
+        <p:style>
+          <a:lnRef idx="2">
+            <a:schemeClr val="accent1">
+              <a:shade val="50000"/>
+            </a:schemeClr>
+          </a:lnRef>
+          <a:fillRef idx="1">
+            <a:schemeClr val="accent1"/>
+          </a:fillRef>
+          <a:effectRef idx="0">
+            <a:schemeClr val="accent1"/>
+          </a:effectRef>
+          <a:fontRef idx="minor">
+            <a:schemeClr val="lt1"/>
+          </a:fontRef>
+        </p:style>
+        <p:txBody>
+          <a:bodyPr rtlCol="0" anchor="ctr"/>
+          <a:lstStyle/>
+          <a:p>
+            <a:pPr algn="ctr"/>
+            <a:endParaRPr lang="de-CH"/>
           </a:p>
         </p:txBody>
       </p:sp>
@@ -9019,7 +9018,6 @@
               <a:rPr lang="de-CH" sz="4400" dirty="0"/>
               <a:t>4</a:t>
             </a:r>
-            <a:endParaRPr lang="de-CH" sz="4400" dirty="0"/>
           </a:p>
         </p:txBody>
       </p:sp>
@@ -9225,7 +9223,6 @@
               <a:rPr lang="de-CH" sz="4400" dirty="0"/>
               <a:t>4</a:t>
             </a:r>
-            <a:endParaRPr lang="de-CH" sz="4400" dirty="0"/>
           </a:p>
         </p:txBody>
       </p:sp>
@@ -9570,7 +9567,6 @@
               <a:rPr lang="de-CH" sz="4400" dirty="0"/>
               <a:t>4</a:t>
             </a:r>
-            <a:endParaRPr lang="de-CH" sz="4400" dirty="0"/>
           </a:p>
         </p:txBody>
       </p:sp>

</xml_diff>